<commit_message>
ppt and other documents
</commit_message>
<xml_diff>
--- a/ppt/proposal.pptx
+++ b/ppt/proposal.pptx
@@ -39,7 +39,7 @@
             <a:spLocks noGrp="1"/>
           </p:cNvSpPr>
           <p:nvPr>
-            <p:ph type="ftr" idx="2"/>
+            <p:ph type="ftr" idx="1"/>
           </p:nvPr>
         </p:nvSpPr>
         <p:spPr/>
@@ -59,14 +59,14 @@
             <a:spLocks noGrp="1"/>
           </p:cNvSpPr>
           <p:nvPr>
-            <p:ph type="sldNum" idx="3"/>
+            <p:ph type="sldNum" idx="2"/>
           </p:nvPr>
         </p:nvSpPr>
         <p:spPr/>
         <p:txBody>
           <a:bodyPr/>
           <a:p>
-            <a:fld id="{A853B0CF-A46F-4460-9C41-25D03DACBCAE}" type="slidenum">
+            <a:fld id="{E1FDAEAC-33EC-4B5F-A7D0-3E3712FF1C31}" type="slidenum">
               <a:t>&lt;#&gt;</a:t>
             </a:fld>
           </a:p>
@@ -79,7 +79,7 @@
             <a:spLocks noGrp="1"/>
           </p:cNvSpPr>
           <p:nvPr>
-            <p:ph type="dt" idx="1"/>
+            <p:ph type="dt" idx="3"/>
           </p:nvPr>
         </p:nvSpPr>
         <p:spPr/>
@@ -128,7 +128,7 @@
         <p:spPr>
           <a:xfrm>
             <a:off x="504000" y="226080"/>
-            <a:ext cx="9071640" cy="946440"/>
+            <a:ext cx="9071280" cy="946080"/>
           </a:xfrm>
           <a:prstGeom prst="rect">
             <a:avLst/>
@@ -168,7 +168,7 @@
         <p:spPr>
           <a:xfrm>
             <a:off x="504000" y="1326600"/>
-            <a:ext cx="9071640" cy="1568160"/>
+            <a:ext cx="9072000" cy="1568520"/>
           </a:xfrm>
           <a:prstGeom prst="rect">
             <a:avLst/>
@@ -210,8 +210,8 @@
         </p:nvSpPr>
         <p:spPr>
           <a:xfrm>
-            <a:off x="504000" y="3044160"/>
-            <a:ext cx="9071640" cy="1568160"/>
+            <a:off x="504000" y="3044520"/>
+            <a:ext cx="9072000" cy="1568520"/>
           </a:xfrm>
           <a:prstGeom prst="rect">
             <a:avLst/>
@@ -248,7 +248,7 @@
             <a:spLocks noGrp="1"/>
           </p:cNvSpPr>
           <p:nvPr>
-            <p:ph type="ftr" idx="2"/>
+            <p:ph type="ftr" idx="1"/>
           </p:nvPr>
         </p:nvSpPr>
         <p:spPr/>
@@ -268,14 +268,14 @@
             <a:spLocks noGrp="1"/>
           </p:cNvSpPr>
           <p:nvPr>
-            <p:ph type="sldNum" idx="3"/>
+            <p:ph type="sldNum" idx="2"/>
           </p:nvPr>
         </p:nvSpPr>
         <p:spPr/>
         <p:txBody>
           <a:bodyPr/>
           <a:p>
-            <a:fld id="{C52C3E36-3EF4-4B0B-887B-7C06A0A4FD50}" type="slidenum">
+            <a:fld id="{C462042B-B53A-4B5B-9FE2-C1847129DC69}" type="slidenum">
               <a:t>&lt;#&gt;</a:t>
             </a:fld>
           </a:p>
@@ -288,7 +288,7 @@
             <a:spLocks noGrp="1"/>
           </p:cNvSpPr>
           <p:nvPr>
-            <p:ph type="dt" idx="1"/>
+            <p:ph type="dt" idx="3"/>
           </p:nvPr>
         </p:nvSpPr>
         <p:spPr/>
@@ -337,7 +337,7 @@
         <p:spPr>
           <a:xfrm>
             <a:off x="504000" y="226080"/>
-            <a:ext cx="9071640" cy="946440"/>
+            <a:ext cx="9071280" cy="946080"/>
           </a:xfrm>
           <a:prstGeom prst="rect">
             <a:avLst/>
@@ -377,7 +377,7 @@
         <p:spPr>
           <a:xfrm>
             <a:off x="504000" y="1326600"/>
-            <a:ext cx="4426920" cy="1568160"/>
+            <a:ext cx="4426920" cy="1568520"/>
           </a:xfrm>
           <a:prstGeom prst="rect">
             <a:avLst/>
@@ -420,7 +420,7 @@
         <p:spPr>
           <a:xfrm>
             <a:off x="5152680" y="1326600"/>
-            <a:ext cx="4426920" cy="1568160"/>
+            <a:ext cx="4426920" cy="1568520"/>
           </a:xfrm>
           <a:prstGeom prst="rect">
             <a:avLst/>
@@ -462,8 +462,8 @@
         </p:nvSpPr>
         <p:spPr>
           <a:xfrm>
-            <a:off x="504000" y="3044160"/>
-            <a:ext cx="4426920" cy="1568160"/>
+            <a:off x="504000" y="3044520"/>
+            <a:ext cx="4426920" cy="1568520"/>
           </a:xfrm>
           <a:prstGeom prst="rect">
             <a:avLst/>
@@ -505,8 +505,8 @@
         </p:nvSpPr>
         <p:spPr>
           <a:xfrm>
-            <a:off x="5152680" y="3044160"/>
-            <a:ext cx="4426920" cy="1568160"/>
+            <a:off x="5152680" y="3044520"/>
+            <a:ext cx="4426920" cy="1568520"/>
           </a:xfrm>
           <a:prstGeom prst="rect">
             <a:avLst/>
@@ -543,7 +543,7 @@
             <a:spLocks noGrp="1"/>
           </p:cNvSpPr>
           <p:nvPr>
-            <p:ph type="ftr" idx="2"/>
+            <p:ph type="ftr" idx="1"/>
           </p:nvPr>
         </p:nvSpPr>
         <p:spPr/>
@@ -563,14 +563,14 @@
             <a:spLocks noGrp="1"/>
           </p:cNvSpPr>
           <p:nvPr>
-            <p:ph type="sldNum" idx="3"/>
+            <p:ph type="sldNum" idx="2"/>
           </p:nvPr>
         </p:nvSpPr>
         <p:spPr/>
         <p:txBody>
           <a:bodyPr/>
           <a:p>
-            <a:fld id="{BDF77D00-159E-48E9-9321-A73E8E31A74B}" type="slidenum">
+            <a:fld id="{B7E7DA9B-5624-4BCE-B061-55F0FF73B350}" type="slidenum">
               <a:t>&lt;#&gt;</a:t>
             </a:fld>
           </a:p>
@@ -583,7 +583,7 @@
             <a:spLocks noGrp="1"/>
           </p:cNvSpPr>
           <p:nvPr>
-            <p:ph type="dt" idx="1"/>
+            <p:ph type="dt" idx="3"/>
           </p:nvPr>
         </p:nvSpPr>
         <p:spPr/>
@@ -632,7 +632,7 @@
         <p:spPr>
           <a:xfrm>
             <a:off x="504000" y="226080"/>
-            <a:ext cx="9071640" cy="946440"/>
+            <a:ext cx="9071280" cy="946080"/>
           </a:xfrm>
           <a:prstGeom prst="rect">
             <a:avLst/>
@@ -672,7 +672,7 @@
         <p:spPr>
           <a:xfrm>
             <a:off x="504000" y="1326600"/>
-            <a:ext cx="2920680" cy="1568160"/>
+            <a:ext cx="2921040" cy="1568520"/>
           </a:xfrm>
           <a:prstGeom prst="rect">
             <a:avLst/>
@@ -714,8 +714,8 @@
         </p:nvSpPr>
         <p:spPr>
           <a:xfrm>
-            <a:off x="3571200" y="1326600"/>
-            <a:ext cx="2920680" cy="1568160"/>
+            <a:off x="3571560" y="1326600"/>
+            <a:ext cx="2921040" cy="1568520"/>
           </a:xfrm>
           <a:prstGeom prst="rect">
             <a:avLst/>
@@ -757,8 +757,8 @@
         </p:nvSpPr>
         <p:spPr>
           <a:xfrm>
-            <a:off x="6638040" y="1326600"/>
-            <a:ext cx="2920680" cy="1568160"/>
+            <a:off x="6639120" y="1326600"/>
+            <a:ext cx="2921040" cy="1568520"/>
           </a:xfrm>
           <a:prstGeom prst="rect">
             <a:avLst/>
@@ -800,8 +800,8 @@
         </p:nvSpPr>
         <p:spPr>
           <a:xfrm>
-            <a:off x="504000" y="3044160"/>
-            <a:ext cx="2920680" cy="1568160"/>
+            <a:off x="504000" y="3044520"/>
+            <a:ext cx="2921040" cy="1568520"/>
           </a:xfrm>
           <a:prstGeom prst="rect">
             <a:avLst/>
@@ -843,8 +843,8 @@
         </p:nvSpPr>
         <p:spPr>
           <a:xfrm>
-            <a:off x="3571200" y="3044160"/>
-            <a:ext cx="2920680" cy="1568160"/>
+            <a:off x="3571560" y="3044520"/>
+            <a:ext cx="2921040" cy="1568520"/>
           </a:xfrm>
           <a:prstGeom prst="rect">
             <a:avLst/>
@@ -886,8 +886,8 @@
         </p:nvSpPr>
         <p:spPr>
           <a:xfrm>
-            <a:off x="6638040" y="3044160"/>
-            <a:ext cx="2920680" cy="1568160"/>
+            <a:off x="6639120" y="3044520"/>
+            <a:ext cx="2921040" cy="1568520"/>
           </a:xfrm>
           <a:prstGeom prst="rect">
             <a:avLst/>
@@ -924,7 +924,7 @@
             <a:spLocks noGrp="1"/>
           </p:cNvSpPr>
           <p:nvPr>
-            <p:ph type="ftr" idx="2"/>
+            <p:ph type="ftr" idx="1"/>
           </p:nvPr>
         </p:nvSpPr>
         <p:spPr/>
@@ -944,14 +944,14 @@
             <a:spLocks noGrp="1"/>
           </p:cNvSpPr>
           <p:nvPr>
-            <p:ph type="sldNum" idx="3"/>
+            <p:ph type="sldNum" idx="2"/>
           </p:nvPr>
         </p:nvSpPr>
         <p:spPr/>
         <p:txBody>
           <a:bodyPr/>
           <a:p>
-            <a:fld id="{0AF62E0E-89C5-4DB5-B790-92F0233E0463}" type="slidenum">
+            <a:fld id="{73568E00-06E7-4B9C-9BBE-6A08B14B313C}" type="slidenum">
               <a:t>&lt;#&gt;</a:t>
             </a:fld>
           </a:p>
@@ -964,7 +964,7 @@
             <a:spLocks noGrp="1"/>
           </p:cNvSpPr>
           <p:nvPr>
-            <p:ph type="dt" idx="1"/>
+            <p:ph type="dt" idx="3"/>
           </p:nvPr>
         </p:nvSpPr>
         <p:spPr/>
@@ -1013,7 +1013,7 @@
         <p:spPr>
           <a:xfrm>
             <a:off x="504000" y="226080"/>
-            <a:ext cx="9071640" cy="946440"/>
+            <a:ext cx="9071280" cy="946080"/>
           </a:xfrm>
           <a:prstGeom prst="rect">
             <a:avLst/>
@@ -1053,7 +1053,7 @@
         <p:spPr>
           <a:xfrm>
             <a:off x="504000" y="1326600"/>
-            <a:ext cx="9071640" cy="3288240"/>
+            <a:ext cx="9072000" cy="3288600"/>
           </a:xfrm>
           <a:prstGeom prst="rect">
             <a:avLst/>
@@ -1087,7 +1087,7 @@
             <a:spLocks noGrp="1"/>
           </p:cNvSpPr>
           <p:nvPr>
-            <p:ph type="ftr" idx="2"/>
+            <p:ph type="ftr" idx="1"/>
           </p:nvPr>
         </p:nvSpPr>
         <p:spPr/>
@@ -1107,14 +1107,14 @@
             <a:spLocks noGrp="1"/>
           </p:cNvSpPr>
           <p:nvPr>
-            <p:ph type="sldNum" idx="3"/>
+            <p:ph type="sldNum" idx="2"/>
           </p:nvPr>
         </p:nvSpPr>
         <p:spPr/>
         <p:txBody>
           <a:bodyPr/>
           <a:p>
-            <a:fld id="{251D63FF-0653-4BBF-9B71-B50DBCE5A24D}" type="slidenum">
+            <a:fld id="{43EA7B7F-D964-4DA9-834D-2A35461EFBC5}" type="slidenum">
               <a:t>&lt;#&gt;</a:t>
             </a:fld>
           </a:p>
@@ -1127,7 +1127,7 @@
             <a:spLocks noGrp="1"/>
           </p:cNvSpPr>
           <p:nvPr>
-            <p:ph type="dt" idx="1"/>
+            <p:ph type="dt" idx="3"/>
           </p:nvPr>
         </p:nvSpPr>
         <p:spPr/>
@@ -1176,7 +1176,7 @@
         <p:spPr>
           <a:xfrm>
             <a:off x="504000" y="226080"/>
-            <a:ext cx="9071640" cy="946440"/>
+            <a:ext cx="9071280" cy="946080"/>
           </a:xfrm>
           <a:prstGeom prst="rect">
             <a:avLst/>
@@ -1216,7 +1216,7 @@
         <p:spPr>
           <a:xfrm>
             <a:off x="504000" y="1326600"/>
-            <a:ext cx="9071640" cy="3288240"/>
+            <a:ext cx="9072000" cy="3288600"/>
           </a:xfrm>
           <a:prstGeom prst="rect">
             <a:avLst/>
@@ -1253,7 +1253,7 @@
             <a:spLocks noGrp="1"/>
           </p:cNvSpPr>
           <p:nvPr>
-            <p:ph type="ftr" idx="2"/>
+            <p:ph type="ftr" idx="1"/>
           </p:nvPr>
         </p:nvSpPr>
         <p:spPr/>
@@ -1273,14 +1273,14 @@
             <a:spLocks noGrp="1"/>
           </p:cNvSpPr>
           <p:nvPr>
-            <p:ph type="sldNum" idx="3"/>
+            <p:ph type="sldNum" idx="2"/>
           </p:nvPr>
         </p:nvSpPr>
         <p:spPr/>
         <p:txBody>
           <a:bodyPr/>
           <a:p>
-            <a:fld id="{B67B3CB9-7152-4993-8AB3-2617579357ED}" type="slidenum">
+            <a:fld id="{8D720A0E-A95D-4ACE-8D55-B1B23631CEFB}" type="slidenum">
               <a:t>&lt;#&gt;</a:t>
             </a:fld>
           </a:p>
@@ -1293,7 +1293,7 @@
             <a:spLocks noGrp="1"/>
           </p:cNvSpPr>
           <p:nvPr>
-            <p:ph type="dt" idx="1"/>
+            <p:ph type="dt" idx="3"/>
           </p:nvPr>
         </p:nvSpPr>
         <p:spPr/>
@@ -1342,7 +1342,7 @@
         <p:spPr>
           <a:xfrm>
             <a:off x="504000" y="226080"/>
-            <a:ext cx="9071640" cy="946440"/>
+            <a:ext cx="9071280" cy="946080"/>
           </a:xfrm>
           <a:prstGeom prst="rect">
             <a:avLst/>
@@ -1382,7 +1382,7 @@
         <p:spPr>
           <a:xfrm>
             <a:off x="504000" y="1326600"/>
-            <a:ext cx="4426920" cy="3288240"/>
+            <a:ext cx="4426920" cy="3288600"/>
           </a:xfrm>
           <a:prstGeom prst="rect">
             <a:avLst/>
@@ -1425,7 +1425,7 @@
         <p:spPr>
           <a:xfrm>
             <a:off x="5152680" y="1326600"/>
-            <a:ext cx="4426920" cy="3288240"/>
+            <a:ext cx="4426920" cy="3288600"/>
           </a:xfrm>
           <a:prstGeom prst="rect">
             <a:avLst/>
@@ -1462,7 +1462,7 @@
             <a:spLocks noGrp="1"/>
           </p:cNvSpPr>
           <p:nvPr>
-            <p:ph type="ftr" idx="2"/>
+            <p:ph type="ftr" idx="1"/>
           </p:nvPr>
         </p:nvSpPr>
         <p:spPr/>
@@ -1482,14 +1482,14 @@
             <a:spLocks noGrp="1"/>
           </p:cNvSpPr>
           <p:nvPr>
-            <p:ph type="sldNum" idx="3"/>
+            <p:ph type="sldNum" idx="2"/>
           </p:nvPr>
         </p:nvSpPr>
         <p:spPr/>
         <p:txBody>
           <a:bodyPr/>
           <a:p>
-            <a:fld id="{346C769C-BECC-459B-96C8-7D067CA06757}" type="slidenum">
+            <a:fld id="{AAE6503C-A71D-45DB-A335-A91132ECDDBD}" type="slidenum">
               <a:t>&lt;#&gt;</a:t>
             </a:fld>
           </a:p>
@@ -1502,7 +1502,7 @@
             <a:spLocks noGrp="1"/>
           </p:cNvSpPr>
           <p:nvPr>
-            <p:ph type="dt" idx="1"/>
+            <p:ph type="dt" idx="3"/>
           </p:nvPr>
         </p:nvSpPr>
         <p:spPr/>
@@ -1551,7 +1551,7 @@
         <p:spPr>
           <a:xfrm>
             <a:off x="504000" y="226080"/>
-            <a:ext cx="9071640" cy="946440"/>
+            <a:ext cx="9071280" cy="946080"/>
           </a:xfrm>
           <a:prstGeom prst="rect">
             <a:avLst/>
@@ -1585,7 +1585,7 @@
             <a:spLocks noGrp="1"/>
           </p:cNvSpPr>
           <p:nvPr>
-            <p:ph type="ftr" idx="2"/>
+            <p:ph type="ftr" idx="1"/>
           </p:nvPr>
         </p:nvSpPr>
         <p:spPr/>
@@ -1605,14 +1605,14 @@
             <a:spLocks noGrp="1"/>
           </p:cNvSpPr>
           <p:nvPr>
-            <p:ph type="sldNum" idx="3"/>
+            <p:ph type="sldNum" idx="2"/>
           </p:nvPr>
         </p:nvSpPr>
         <p:spPr/>
         <p:txBody>
           <a:bodyPr/>
           <a:p>
-            <a:fld id="{B99A7934-BF8E-4D09-89A3-AD060E667A97}" type="slidenum">
+            <a:fld id="{504F3DC4-5243-4E10-AD53-FC039C9C6B25}" type="slidenum">
               <a:t>&lt;#&gt;</a:t>
             </a:fld>
           </a:p>
@@ -1625,7 +1625,7 @@
             <a:spLocks noGrp="1"/>
           </p:cNvSpPr>
           <p:nvPr>
-            <p:ph type="dt" idx="1"/>
+            <p:ph type="dt" idx="3"/>
           </p:nvPr>
         </p:nvSpPr>
         <p:spPr/>
@@ -1674,7 +1674,7 @@
         <p:spPr>
           <a:xfrm>
             <a:off x="504000" y="226080"/>
-            <a:ext cx="9071640" cy="4388400"/>
+            <a:ext cx="9071280" cy="4386600"/>
           </a:xfrm>
           <a:prstGeom prst="rect">
             <a:avLst/>
@@ -1706,7 +1706,7 @@
             <a:spLocks noGrp="1"/>
           </p:cNvSpPr>
           <p:nvPr>
-            <p:ph type="ftr" idx="2"/>
+            <p:ph type="ftr" idx="1"/>
           </p:nvPr>
         </p:nvSpPr>
         <p:spPr/>
@@ -1726,14 +1726,14 @@
             <a:spLocks noGrp="1"/>
           </p:cNvSpPr>
           <p:nvPr>
-            <p:ph type="sldNum" idx="3"/>
+            <p:ph type="sldNum" idx="2"/>
           </p:nvPr>
         </p:nvSpPr>
         <p:spPr/>
         <p:txBody>
           <a:bodyPr/>
           <a:p>
-            <a:fld id="{D6DCBE58-B63E-41F0-8329-94569AEECA03}" type="slidenum">
+            <a:fld id="{A48F420C-D185-493C-96E7-B83D75E9EE10}" type="slidenum">
               <a:t>&lt;#&gt;</a:t>
             </a:fld>
           </a:p>
@@ -1746,7 +1746,7 @@
             <a:spLocks noGrp="1"/>
           </p:cNvSpPr>
           <p:nvPr>
-            <p:ph type="dt" idx="1"/>
+            <p:ph type="dt" idx="3"/>
           </p:nvPr>
         </p:nvSpPr>
         <p:spPr/>
@@ -1795,7 +1795,7 @@
         <p:spPr>
           <a:xfrm>
             <a:off x="504000" y="226080"/>
-            <a:ext cx="9071640" cy="946440"/>
+            <a:ext cx="9071280" cy="946080"/>
           </a:xfrm>
           <a:prstGeom prst="rect">
             <a:avLst/>
@@ -1835,7 +1835,7 @@
         <p:spPr>
           <a:xfrm>
             <a:off x="504000" y="1326600"/>
-            <a:ext cx="4426920" cy="1568160"/>
+            <a:ext cx="4426920" cy="1568520"/>
           </a:xfrm>
           <a:prstGeom prst="rect">
             <a:avLst/>
@@ -1878,7 +1878,7 @@
         <p:spPr>
           <a:xfrm>
             <a:off x="5152680" y="1326600"/>
-            <a:ext cx="4426920" cy="3288240"/>
+            <a:ext cx="4426920" cy="3288600"/>
           </a:xfrm>
           <a:prstGeom prst="rect">
             <a:avLst/>
@@ -1920,8 +1920,8 @@
         </p:nvSpPr>
         <p:spPr>
           <a:xfrm>
-            <a:off x="504000" y="3044160"/>
-            <a:ext cx="4426920" cy="1568160"/>
+            <a:off x="504000" y="3044520"/>
+            <a:ext cx="4426920" cy="1568520"/>
           </a:xfrm>
           <a:prstGeom prst="rect">
             <a:avLst/>
@@ -1958,7 +1958,7 @@
             <a:spLocks noGrp="1"/>
           </p:cNvSpPr>
           <p:nvPr>
-            <p:ph type="ftr" idx="2"/>
+            <p:ph type="ftr" idx="1"/>
           </p:nvPr>
         </p:nvSpPr>
         <p:spPr/>
@@ -1978,14 +1978,14 @@
             <a:spLocks noGrp="1"/>
           </p:cNvSpPr>
           <p:nvPr>
-            <p:ph type="sldNum" idx="3"/>
+            <p:ph type="sldNum" idx="2"/>
           </p:nvPr>
         </p:nvSpPr>
         <p:spPr/>
         <p:txBody>
           <a:bodyPr/>
           <a:p>
-            <a:fld id="{250E2FEE-5691-470B-BCBF-7FF4A0490C75}" type="slidenum">
+            <a:fld id="{A71C6298-5394-444D-8EDB-C0578DB203F1}" type="slidenum">
               <a:t>&lt;#&gt;</a:t>
             </a:fld>
           </a:p>
@@ -1998,7 +1998,7 @@
             <a:spLocks noGrp="1"/>
           </p:cNvSpPr>
           <p:nvPr>
-            <p:ph type="dt" idx="1"/>
+            <p:ph type="dt" idx="3"/>
           </p:nvPr>
         </p:nvSpPr>
         <p:spPr/>
@@ -2047,7 +2047,7 @@
         <p:spPr>
           <a:xfrm>
             <a:off x="504000" y="226080"/>
-            <a:ext cx="9071640" cy="946440"/>
+            <a:ext cx="9071280" cy="946080"/>
           </a:xfrm>
           <a:prstGeom prst="rect">
             <a:avLst/>
@@ -2087,7 +2087,7 @@
         <p:spPr>
           <a:xfrm>
             <a:off x="504000" y="1326600"/>
-            <a:ext cx="4426920" cy="3288240"/>
+            <a:ext cx="4426920" cy="3288600"/>
           </a:xfrm>
           <a:prstGeom prst="rect">
             <a:avLst/>
@@ -2130,7 +2130,7 @@
         <p:spPr>
           <a:xfrm>
             <a:off x="5152680" y="1326600"/>
-            <a:ext cx="4426920" cy="1568160"/>
+            <a:ext cx="4426920" cy="1568520"/>
           </a:xfrm>
           <a:prstGeom prst="rect">
             <a:avLst/>
@@ -2172,8 +2172,8 @@
         </p:nvSpPr>
         <p:spPr>
           <a:xfrm>
-            <a:off x="5152680" y="3044160"/>
-            <a:ext cx="4426920" cy="1568160"/>
+            <a:off x="5152680" y="3044520"/>
+            <a:ext cx="4426920" cy="1568520"/>
           </a:xfrm>
           <a:prstGeom prst="rect">
             <a:avLst/>
@@ -2210,7 +2210,7 @@
             <a:spLocks noGrp="1"/>
           </p:cNvSpPr>
           <p:nvPr>
-            <p:ph type="ftr" idx="2"/>
+            <p:ph type="ftr" idx="1"/>
           </p:nvPr>
         </p:nvSpPr>
         <p:spPr/>
@@ -2230,14 +2230,14 @@
             <a:spLocks noGrp="1"/>
           </p:cNvSpPr>
           <p:nvPr>
-            <p:ph type="sldNum" idx="3"/>
+            <p:ph type="sldNum" idx="2"/>
           </p:nvPr>
         </p:nvSpPr>
         <p:spPr/>
         <p:txBody>
           <a:bodyPr/>
           <a:p>
-            <a:fld id="{66E69719-6E87-44D1-B756-2381515FD992}" type="slidenum">
+            <a:fld id="{A14F3291-E2E4-4FD2-96D3-EA52A6687F71}" type="slidenum">
               <a:t>&lt;#&gt;</a:t>
             </a:fld>
           </a:p>
@@ -2250,7 +2250,7 @@
             <a:spLocks noGrp="1"/>
           </p:cNvSpPr>
           <p:nvPr>
-            <p:ph type="dt" idx="1"/>
+            <p:ph type="dt" idx="3"/>
           </p:nvPr>
         </p:nvSpPr>
         <p:spPr/>
@@ -2299,7 +2299,7 @@
         <p:spPr>
           <a:xfrm>
             <a:off x="504000" y="226080"/>
-            <a:ext cx="9071640" cy="946440"/>
+            <a:ext cx="9071280" cy="946080"/>
           </a:xfrm>
           <a:prstGeom prst="rect">
             <a:avLst/>
@@ -2339,7 +2339,7 @@
         <p:spPr>
           <a:xfrm>
             <a:off x="504000" y="1326600"/>
-            <a:ext cx="4426920" cy="1568160"/>
+            <a:ext cx="4426920" cy="1568520"/>
           </a:xfrm>
           <a:prstGeom prst="rect">
             <a:avLst/>
@@ -2382,7 +2382,7 @@
         <p:spPr>
           <a:xfrm>
             <a:off x="5152680" y="1326600"/>
-            <a:ext cx="4426920" cy="1568160"/>
+            <a:ext cx="4426920" cy="1568520"/>
           </a:xfrm>
           <a:prstGeom prst="rect">
             <a:avLst/>
@@ -2424,8 +2424,8 @@
         </p:nvSpPr>
         <p:spPr>
           <a:xfrm>
-            <a:off x="504000" y="3044160"/>
-            <a:ext cx="9071640" cy="1568160"/>
+            <a:off x="504000" y="3044520"/>
+            <a:ext cx="9072000" cy="1568520"/>
           </a:xfrm>
           <a:prstGeom prst="rect">
             <a:avLst/>
@@ -2462,7 +2462,7 @@
             <a:spLocks noGrp="1"/>
           </p:cNvSpPr>
           <p:nvPr>
-            <p:ph type="ftr" idx="2"/>
+            <p:ph type="ftr" idx="1"/>
           </p:nvPr>
         </p:nvSpPr>
         <p:spPr/>
@@ -2482,14 +2482,14 @@
             <a:spLocks noGrp="1"/>
           </p:cNvSpPr>
           <p:nvPr>
-            <p:ph type="sldNum" idx="3"/>
+            <p:ph type="sldNum" idx="2"/>
           </p:nvPr>
         </p:nvSpPr>
         <p:spPr/>
         <p:txBody>
           <a:bodyPr/>
           <a:p>
-            <a:fld id="{3D8F139D-FC2D-4685-B2A6-0048B2B41AA6}" type="slidenum">
+            <a:fld id="{7CB05A1A-B335-4463-8242-5FC474C32023}" type="slidenum">
               <a:t>&lt;#&gt;</a:t>
             </a:fld>
           </a:p>
@@ -2502,7 +2502,7 @@
             <a:spLocks noGrp="1"/>
           </p:cNvSpPr>
           <p:nvPr>
-            <p:ph type="dt" idx="1"/>
+            <p:ph type="dt" idx="3"/>
           </p:nvPr>
         </p:nvSpPr>
         <p:spPr/>
@@ -2551,7 +2551,7 @@
         <p:spPr>
           <a:xfrm>
             <a:off x="504000" y="226080"/>
-            <a:ext cx="9071640" cy="946440"/>
+            <a:ext cx="9071280" cy="946080"/>
           </a:xfrm>
           <a:prstGeom prst="rect">
             <a:avLst/>
@@ -2566,11 +2566,11 @@
             <a:noAutofit/>
           </a:bodyPr>
           <a:p>
-            <a:pPr indent="0" algn="ctr">
+            <a:pPr indent="0">
               <a:buNone/>
             </a:pPr>
             <a:r>
-              <a:rPr b="0" lang="en-US" sz="4400" spc="-1" strike="noStrike">
+              <a:rPr b="0" lang="en-US" sz="1800" spc="-1" strike="noStrike">
                 <a:solidFill>
                   <a:srgbClr val="000000"/>
                 </a:solidFill>
@@ -2578,7 +2578,7 @@
               </a:rPr>
               <a:t>Click to edit the title text format</a:t>
             </a:r>
-            <a:endParaRPr b="0" lang="en-US" sz="4400" spc="-1" strike="noStrike">
+            <a:endParaRPr b="0" lang="en-US" sz="1800" spc="-1" strike="noStrike">
               <a:solidFill>
                 <a:srgbClr val="000000"/>
               </a:solidFill>
@@ -2594,13 +2594,13 @@
             <a:spLocks noGrp="1"/>
           </p:cNvSpPr>
           <p:nvPr>
-            <p:ph type="body"/>
-          </p:nvPr>
-        </p:nvSpPr>
-        <p:spPr>
-          <a:xfrm>
-            <a:off x="504000" y="1326600"/>
-            <a:ext cx="9071640" cy="3288240"/>
+            <p:ph type="ftr" idx="1"/>
+          </p:nvPr>
+        </p:nvSpPr>
+        <p:spPr>
+          <a:xfrm>
+            <a:off x="3447360" y="5165280"/>
+            <a:ext cx="3194640" cy="390240"/>
           </a:xfrm>
           <a:prstGeom prst="rect">
             <a:avLst/>
@@ -2612,220 +2612,139 @@
         </p:spPr>
         <p:txBody>
           <a:bodyPr lIns="0" rIns="0" tIns="0" bIns="0" anchor="t">
-            <a:normAutofit/>
-          </a:bodyPr>
-          <a:p>
-            <a:pPr marL="432000" indent="-324000">
-              <a:spcBef>
-                <a:spcPts val="1417"/>
-              </a:spcBef>
-              <a:buClr>
-                <a:srgbClr val="000000"/>
-              </a:buClr>
-              <a:buSzPct val="45000"/>
-              <a:buFont typeface="Wingdings" charset="2"/>
-              <a:buChar char=""/>
-            </a:pPr>
-            <a:r>
-              <a:rPr b="0" lang="en-US" sz="3200" spc="-1" strike="noStrike">
+            <a:noAutofit/>
+          </a:bodyPr>
+          <a:lstStyle>
+            <a:lvl1pPr indent="0" algn="ctr">
+              <a:lnSpc>
+                <a:spcPct val="100000"/>
+              </a:lnSpc>
+              <a:buNone/>
+              <a:tabLst>
+                <a:tab algn="l" pos="0"/>
+              </a:tabLst>
+              <a:defRPr b="0" lang="en-US" sz="1400" spc="-1" strike="noStrike">
                 <a:solidFill>
                   <a:srgbClr val="000000"/>
                 </a:solidFill>
-                <a:latin typeface="Arial"/>
-              </a:rPr>
-              <a:t>Click to edit the outline text format</a:t>
-            </a:r>
-            <a:endParaRPr b="0" lang="en-US" sz="3200" spc="-1" strike="noStrike">
-              <a:solidFill>
-                <a:srgbClr val="000000"/>
-              </a:solidFill>
-              <a:latin typeface="Arial"/>
-            </a:endParaRPr>
-          </a:p>
-          <a:p>
-            <a:pPr lvl="1" marL="864000" indent="-324000">
-              <a:spcBef>
-                <a:spcPts val="1134"/>
-              </a:spcBef>
-              <a:buClr>
-                <a:srgbClr val="000000"/>
-              </a:buClr>
-              <a:buSzPct val="75000"/>
-              <a:buFont typeface="Symbol" charset="2"/>
-              <a:buChar char=""/>
+                <a:latin typeface="Times New Roman"/>
+              </a:defRPr>
+            </a:lvl1pPr>
+          </a:lstStyle>
+          <a:p>
+            <a:pPr indent="0" algn="ctr">
+              <a:lnSpc>
+                <a:spcPct val="100000"/>
+              </a:lnSpc>
+              <a:buNone/>
+              <a:tabLst>
+                <a:tab algn="l" pos="0"/>
+              </a:tabLst>
             </a:pPr>
             <a:r>
-              <a:rPr b="0" lang="en-US" sz="2800" spc="-1" strike="noStrike">
+              <a:rPr b="0" lang="en-US" sz="1400" spc="-1" strike="noStrike">
                 <a:solidFill>
                   <a:srgbClr val="000000"/>
                 </a:solidFill>
-                <a:latin typeface="Arial"/>
+                <a:latin typeface="Times New Roman"/>
               </a:rPr>
-              <a:t>Second Outline Level</a:t>
+              <a:t>&lt;footer&gt;</a:t>
             </a:r>
-            <a:endParaRPr b="0" lang="en-US" sz="2800" spc="-1" strike="noStrike">
-              <a:solidFill>
-                <a:srgbClr val="000000"/>
-              </a:solidFill>
-              <a:latin typeface="Arial"/>
-            </a:endParaRPr>
-          </a:p>
-          <a:p>
-            <a:pPr lvl="2" marL="1296000" indent="-288000">
-              <a:spcBef>
-                <a:spcPts val="850"/>
-              </a:spcBef>
-              <a:buClr>
-                <a:srgbClr val="000000"/>
-              </a:buClr>
-              <a:buSzPct val="45000"/>
-              <a:buFont typeface="Wingdings" charset="2"/>
-              <a:buChar char=""/>
-            </a:pPr>
-            <a:r>
-              <a:rPr b="0" lang="en-US" sz="2400" spc="-1" strike="noStrike">
+            <a:endParaRPr b="0" lang="en-US" sz="1400" spc="-1" strike="noStrike">
+              <a:solidFill>
+                <a:srgbClr val="000000"/>
+              </a:solidFill>
+              <a:latin typeface="Times New Roman"/>
+            </a:endParaRPr>
+          </a:p>
+        </p:txBody>
+      </p:sp>
+      <p:sp>
+        <p:nvSpPr>
+          <p:cNvPr id="2" name="PlaceHolder 3"/>
+          <p:cNvSpPr>
+            <a:spLocks noGrp="1"/>
+          </p:cNvSpPr>
+          <p:nvPr>
+            <p:ph type="sldNum" idx="2"/>
+          </p:nvPr>
+        </p:nvSpPr>
+        <p:spPr>
+          <a:xfrm>
+            <a:off x="7227360" y="5165280"/>
+            <a:ext cx="2347920" cy="390240"/>
+          </a:xfrm>
+          <a:prstGeom prst="rect">
+            <a:avLst/>
+          </a:prstGeom>
+          <a:noFill/>
+          <a:ln w="0">
+            <a:noFill/>
+          </a:ln>
+        </p:spPr>
+        <p:txBody>
+          <a:bodyPr lIns="0" rIns="0" tIns="0" bIns="0" anchor="t">
+            <a:noAutofit/>
+          </a:bodyPr>
+          <a:lstStyle>
+            <a:lvl1pPr indent="0" algn="r">
+              <a:lnSpc>
+                <a:spcPct val="100000"/>
+              </a:lnSpc>
+              <a:buNone/>
+              <a:tabLst>
+                <a:tab algn="l" pos="0"/>
+              </a:tabLst>
+              <a:defRPr b="0" lang="en-US" sz="1400" spc="-1" strike="noStrike">
                 <a:solidFill>
                   <a:srgbClr val="000000"/>
                 </a:solidFill>
-                <a:latin typeface="Arial"/>
-              </a:rPr>
-              <a:t>Third Outline Level</a:t>
-            </a:r>
-            <a:endParaRPr b="0" lang="en-US" sz="2400" spc="-1" strike="noStrike">
-              <a:solidFill>
-                <a:srgbClr val="000000"/>
-              </a:solidFill>
-              <a:latin typeface="Arial"/>
-            </a:endParaRPr>
-          </a:p>
-          <a:p>
-            <a:pPr lvl="3" marL="1728000" indent="-216000">
-              <a:spcBef>
-                <a:spcPts val="567"/>
-              </a:spcBef>
-              <a:buClr>
-                <a:srgbClr val="000000"/>
-              </a:buClr>
-              <a:buSzPct val="75000"/>
-              <a:buFont typeface="Symbol" charset="2"/>
-              <a:buChar char=""/>
-            </a:pPr>
-            <a:r>
-              <a:rPr b="0" lang="en-US" sz="2000" spc="-1" strike="noStrike">
+                <a:latin typeface="Times New Roman"/>
+              </a:defRPr>
+            </a:lvl1pPr>
+          </a:lstStyle>
+          <a:p>
+            <a:pPr indent="0" algn="r">
+              <a:lnSpc>
+                <a:spcPct val="100000"/>
+              </a:lnSpc>
+              <a:buNone/>
+              <a:tabLst>
+                <a:tab algn="l" pos="0"/>
+              </a:tabLst>
+            </a:pPr>
+            <a:fld id="{D1ACD68A-D585-410A-A2A7-56862B56571A}" type="slidenum">
+              <a:rPr b="0" lang="en-US" sz="1400" spc="-1" strike="noStrike">
                 <a:solidFill>
                   <a:srgbClr val="000000"/>
                 </a:solidFill>
-                <a:latin typeface="Arial"/>
+                <a:latin typeface="Times New Roman"/>
               </a:rPr>
-              <a:t>Fourth Outline Level</a:t>
-            </a:r>
-            <a:endParaRPr b="0" lang="en-US" sz="2000" spc="-1" strike="noStrike">
-              <a:solidFill>
-                <a:srgbClr val="000000"/>
-              </a:solidFill>
-              <a:latin typeface="Arial"/>
-            </a:endParaRPr>
-          </a:p>
-          <a:p>
-            <a:pPr lvl="4" marL="2160000" indent="-216000">
-              <a:spcBef>
-                <a:spcPts val="283"/>
-              </a:spcBef>
-              <a:buClr>
-                <a:srgbClr val="000000"/>
-              </a:buClr>
-              <a:buSzPct val="45000"/>
-              <a:buFont typeface="Wingdings" charset="2"/>
-              <a:buChar char=""/>
-            </a:pPr>
-            <a:r>
-              <a:rPr b="0" lang="en-US" sz="2000" spc="-1" strike="noStrike">
-                <a:solidFill>
-                  <a:srgbClr val="000000"/>
-                </a:solidFill>
-                <a:latin typeface="Arial"/>
-              </a:rPr>
-              <a:t>Fifth Outline Level</a:t>
-            </a:r>
-            <a:endParaRPr b="0" lang="en-US" sz="2000" spc="-1" strike="noStrike">
-              <a:solidFill>
-                <a:srgbClr val="000000"/>
-              </a:solidFill>
-              <a:latin typeface="Arial"/>
-            </a:endParaRPr>
-          </a:p>
-          <a:p>
-            <a:pPr lvl="5" marL="2592000" indent="-216000">
-              <a:spcBef>
-                <a:spcPts val="283"/>
-              </a:spcBef>
-              <a:buClr>
-                <a:srgbClr val="000000"/>
-              </a:buClr>
-              <a:buSzPct val="45000"/>
-              <a:buFont typeface="Wingdings" charset="2"/>
-              <a:buChar char=""/>
-            </a:pPr>
-            <a:r>
-              <a:rPr b="0" lang="en-US" sz="2000" spc="-1" strike="noStrike">
-                <a:solidFill>
-                  <a:srgbClr val="000000"/>
-                </a:solidFill>
-                <a:latin typeface="Arial"/>
-              </a:rPr>
-              <a:t>Sixth Outline Level</a:t>
-            </a:r>
-            <a:endParaRPr b="0" lang="en-US" sz="2000" spc="-1" strike="noStrike">
-              <a:solidFill>
-                <a:srgbClr val="000000"/>
-              </a:solidFill>
-              <a:latin typeface="Arial"/>
-            </a:endParaRPr>
-          </a:p>
-          <a:p>
-            <a:pPr lvl="6" marL="3024000" indent="-216000">
-              <a:spcBef>
-                <a:spcPts val="283"/>
-              </a:spcBef>
-              <a:buClr>
-                <a:srgbClr val="000000"/>
-              </a:buClr>
-              <a:buSzPct val="45000"/>
-              <a:buFont typeface="Wingdings" charset="2"/>
-              <a:buChar char=""/>
-            </a:pPr>
-            <a:r>
-              <a:rPr b="0" lang="en-US" sz="2000" spc="-1" strike="noStrike">
-                <a:solidFill>
-                  <a:srgbClr val="000000"/>
-                </a:solidFill>
-                <a:latin typeface="Arial"/>
-              </a:rPr>
-              <a:t>Seventh Outline Level</a:t>
-            </a:r>
-            <a:endParaRPr b="0" lang="en-US" sz="2000" spc="-1" strike="noStrike">
-              <a:solidFill>
-                <a:srgbClr val="000000"/>
-              </a:solidFill>
-              <a:latin typeface="Arial"/>
-            </a:endParaRPr>
-          </a:p>
-        </p:txBody>
-      </p:sp>
-      <p:sp>
-        <p:nvSpPr>
-          <p:cNvPr id="2" name="PlaceHolder 3"/>
-          <p:cNvSpPr>
-            <a:spLocks noGrp="1"/>
-          </p:cNvSpPr>
-          <p:nvPr>
-            <p:ph type="dt" idx="1"/>
+              <a:t>&lt;number&gt;</a:t>
+            </a:fld>
+            <a:endParaRPr b="0" lang="en-US" sz="1400" spc="-1" strike="noStrike">
+              <a:solidFill>
+                <a:srgbClr val="000000"/>
+              </a:solidFill>
+              <a:latin typeface="Times New Roman"/>
+            </a:endParaRPr>
+          </a:p>
+        </p:txBody>
+      </p:sp>
+      <p:sp>
+        <p:nvSpPr>
+          <p:cNvPr id="3" name="PlaceHolder 4"/>
+          <p:cNvSpPr>
+            <a:spLocks noGrp="1"/>
+          </p:cNvSpPr>
+          <p:nvPr>
+            <p:ph type="dt" idx="3"/>
           </p:nvPr>
         </p:nvSpPr>
         <p:spPr>
           <a:xfrm>
             <a:off x="504000" y="5165280"/>
-            <a:ext cx="2348280" cy="390600"/>
+            <a:ext cx="2347920" cy="390240"/>
           </a:xfrm>
           <a:prstGeom prst="rect">
             <a:avLst/>
@@ -2874,18 +2793,18 @@
       </p:sp>
       <p:sp>
         <p:nvSpPr>
-          <p:cNvPr id="3" name="PlaceHolder 4"/>
-          <p:cNvSpPr>
-            <a:spLocks noGrp="1"/>
-          </p:cNvSpPr>
-          <p:nvPr>
-            <p:ph type="ftr" idx="2"/>
-          </p:nvPr>
-        </p:nvSpPr>
-        <p:spPr>
-          <a:xfrm>
-            <a:off x="3447360" y="5165280"/>
-            <a:ext cx="3195000" cy="390600"/>
+          <p:cNvPr id="4" name="PlaceHolder 5"/>
+          <p:cNvSpPr>
+            <a:spLocks noGrp="1"/>
+          </p:cNvSpPr>
+          <p:nvPr>
+            <p:ph type="body"/>
+          </p:nvPr>
+        </p:nvSpPr>
+        <p:spPr>
+          <a:xfrm>
+            <a:off x="504000" y="1326600"/>
+            <a:ext cx="9072000" cy="3288600"/>
           </a:xfrm>
           <a:prstGeom prst="rect">
             <a:avLst/>
@@ -2897,97 +2816,202 @@
         </p:spPr>
         <p:txBody>
           <a:bodyPr lIns="0" rIns="0" tIns="0" bIns="0" anchor="t">
-            <a:noAutofit/>
-          </a:bodyPr>
-          <a:lstStyle>
-            <a:lvl1pPr indent="0" algn="ctr">
-              <a:buNone/>
-              <a:defRPr b="0" lang="en-US" sz="1400" spc="-1" strike="noStrike">
+            <a:normAutofit/>
+          </a:bodyPr>
+          <a:p>
+            <a:pPr marL="432000" indent="-324000">
+              <a:spcBef>
+                <a:spcPts val="1417"/>
+              </a:spcBef>
+              <a:buClr>
+                <a:srgbClr val="000000"/>
+              </a:buClr>
+              <a:buSzPct val="45000"/>
+              <a:buFont typeface="Wingdings" charset="2"/>
+              <a:buChar char=""/>
+            </a:pPr>
+            <a:r>
+              <a:rPr b="0" lang="en-US" sz="3200" spc="-1" strike="noStrike">
                 <a:solidFill>
                   <a:srgbClr val="000000"/>
                 </a:solidFill>
-                <a:latin typeface="Times New Roman"/>
-              </a:defRPr>
-            </a:lvl1pPr>
-          </a:lstStyle>
-          <a:p>
-            <a:pPr indent="0" algn="ctr">
-              <a:buNone/>
+                <a:latin typeface="Arial"/>
+              </a:rPr>
+              <a:t>Click to edit the outline text format</a:t>
+            </a:r>
+            <a:endParaRPr b="0" lang="en-US" sz="3200" spc="-1" strike="noStrike">
+              <a:solidFill>
+                <a:srgbClr val="000000"/>
+              </a:solidFill>
+              <a:latin typeface="Arial"/>
+            </a:endParaRPr>
+          </a:p>
+          <a:p>
+            <a:pPr lvl="1" marL="864000" indent="-324000">
+              <a:spcBef>
+                <a:spcPts val="1134"/>
+              </a:spcBef>
+              <a:buClr>
+                <a:srgbClr val="000000"/>
+              </a:buClr>
+              <a:buSzPct val="75000"/>
+              <a:buFont typeface="Symbol" charset="2"/>
+              <a:buChar char=""/>
             </a:pPr>
             <a:r>
-              <a:rPr b="0" lang="en-US" sz="1400" spc="-1" strike="noStrike">
+              <a:rPr b="0" lang="en-US" sz="2800" spc="-1" strike="noStrike">
                 <a:solidFill>
                   <a:srgbClr val="000000"/>
                 </a:solidFill>
-                <a:latin typeface="Times New Roman"/>
+                <a:latin typeface="Arial"/>
               </a:rPr>
-              <a:t>&lt;footer&gt;</a:t>
+              <a:t>Second Outline Level</a:t>
             </a:r>
-            <a:endParaRPr b="0" lang="en-US" sz="1400" spc="-1" strike="noStrike">
-              <a:solidFill>
-                <a:srgbClr val="000000"/>
-              </a:solidFill>
-              <a:latin typeface="Times New Roman"/>
-            </a:endParaRPr>
-          </a:p>
-        </p:txBody>
-      </p:sp>
-      <p:sp>
-        <p:nvSpPr>
-          <p:cNvPr id="4" name="PlaceHolder 5"/>
-          <p:cNvSpPr>
-            <a:spLocks noGrp="1"/>
-          </p:cNvSpPr>
-          <p:nvPr>
-            <p:ph type="sldNum" idx="3"/>
-          </p:nvPr>
-        </p:nvSpPr>
-        <p:spPr>
-          <a:xfrm>
-            <a:off x="7227360" y="5165280"/>
-            <a:ext cx="2348280" cy="390600"/>
-          </a:xfrm>
-          <a:prstGeom prst="rect">
-            <a:avLst/>
-          </a:prstGeom>
-          <a:noFill/>
-          <a:ln w="0">
-            <a:noFill/>
-          </a:ln>
-        </p:spPr>
-        <p:txBody>
-          <a:bodyPr lIns="0" rIns="0" tIns="0" bIns="0" anchor="t">
-            <a:noAutofit/>
-          </a:bodyPr>
-          <a:lstStyle>
-            <a:lvl1pPr indent="0" algn="r">
-              <a:buNone/>
-              <a:defRPr b="0" lang="en-US" sz="1400" spc="-1" strike="noStrike">
+            <a:endParaRPr b="0" lang="en-US" sz="2800" spc="-1" strike="noStrike">
+              <a:solidFill>
+                <a:srgbClr val="000000"/>
+              </a:solidFill>
+              <a:latin typeface="Arial"/>
+            </a:endParaRPr>
+          </a:p>
+          <a:p>
+            <a:pPr lvl="2" marL="1296000" indent="-288000">
+              <a:spcBef>
+                <a:spcPts val="850"/>
+              </a:spcBef>
+              <a:buClr>
+                <a:srgbClr val="000000"/>
+              </a:buClr>
+              <a:buSzPct val="45000"/>
+              <a:buFont typeface="Wingdings" charset="2"/>
+              <a:buChar char=""/>
+            </a:pPr>
+            <a:r>
+              <a:rPr b="0" lang="en-US" sz="2400" spc="-1" strike="noStrike">
                 <a:solidFill>
                   <a:srgbClr val="000000"/>
                 </a:solidFill>
-                <a:latin typeface="Times New Roman"/>
-              </a:defRPr>
-            </a:lvl1pPr>
-          </a:lstStyle>
-          <a:p>
-            <a:pPr indent="0" algn="r">
-              <a:buNone/>
-            </a:pPr>
-            <a:fld id="{333124A7-1F9C-45BC-8E38-84DE504E72C7}" type="slidenum">
-              <a:rPr b="0" lang="en-US" sz="1400" spc="-1" strike="noStrike">
+                <a:latin typeface="Arial"/>
+              </a:rPr>
+              <a:t>Third Outline Level</a:t>
+            </a:r>
+            <a:endParaRPr b="0" lang="en-US" sz="2400" spc="-1" strike="noStrike">
+              <a:solidFill>
+                <a:srgbClr val="000000"/>
+              </a:solidFill>
+              <a:latin typeface="Arial"/>
+            </a:endParaRPr>
+          </a:p>
+          <a:p>
+            <a:pPr lvl="3" marL="1728000" indent="-216000">
+              <a:spcBef>
+                <a:spcPts val="567"/>
+              </a:spcBef>
+              <a:buClr>
+                <a:srgbClr val="000000"/>
+              </a:buClr>
+              <a:buSzPct val="75000"/>
+              <a:buFont typeface="Symbol" charset="2"/>
+              <a:buChar char=""/>
+            </a:pPr>
+            <a:r>
+              <a:rPr b="0" lang="en-US" sz="2000" spc="-1" strike="noStrike">
                 <a:solidFill>
                   <a:srgbClr val="000000"/>
                 </a:solidFill>
-                <a:latin typeface="Times New Roman"/>
+                <a:latin typeface="Arial"/>
               </a:rPr>
-              <a:t>&lt;number&gt;</a:t>
-            </a:fld>
-            <a:endParaRPr b="0" lang="en-US" sz="1400" spc="-1" strike="noStrike">
-              <a:solidFill>
-                <a:srgbClr val="000000"/>
-              </a:solidFill>
-              <a:latin typeface="Times New Roman"/>
+              <a:t>Fourth Outline Level</a:t>
+            </a:r>
+            <a:endParaRPr b="0" lang="en-US" sz="2000" spc="-1" strike="noStrike">
+              <a:solidFill>
+                <a:srgbClr val="000000"/>
+              </a:solidFill>
+              <a:latin typeface="Arial"/>
+            </a:endParaRPr>
+          </a:p>
+          <a:p>
+            <a:pPr lvl="4" marL="2160000" indent="-216000">
+              <a:spcBef>
+                <a:spcPts val="283"/>
+              </a:spcBef>
+              <a:buClr>
+                <a:srgbClr val="000000"/>
+              </a:buClr>
+              <a:buSzPct val="45000"/>
+              <a:buFont typeface="Wingdings" charset="2"/>
+              <a:buChar char=""/>
+            </a:pPr>
+            <a:r>
+              <a:rPr b="0" lang="en-US" sz="2000" spc="-1" strike="noStrike">
+                <a:solidFill>
+                  <a:srgbClr val="000000"/>
+                </a:solidFill>
+                <a:latin typeface="Arial"/>
+              </a:rPr>
+              <a:t>Fifth Outline Level</a:t>
+            </a:r>
+            <a:endParaRPr b="0" lang="en-US" sz="2000" spc="-1" strike="noStrike">
+              <a:solidFill>
+                <a:srgbClr val="000000"/>
+              </a:solidFill>
+              <a:latin typeface="Arial"/>
+            </a:endParaRPr>
+          </a:p>
+          <a:p>
+            <a:pPr lvl="5" marL="2592000" indent="-216000">
+              <a:spcBef>
+                <a:spcPts val="283"/>
+              </a:spcBef>
+              <a:buClr>
+                <a:srgbClr val="000000"/>
+              </a:buClr>
+              <a:buSzPct val="45000"/>
+              <a:buFont typeface="Wingdings" charset="2"/>
+              <a:buChar char=""/>
+            </a:pPr>
+            <a:r>
+              <a:rPr b="0" lang="en-US" sz="2000" spc="-1" strike="noStrike">
+                <a:solidFill>
+                  <a:srgbClr val="000000"/>
+                </a:solidFill>
+                <a:latin typeface="Arial"/>
+              </a:rPr>
+              <a:t>Sixth Outline Level</a:t>
+            </a:r>
+            <a:endParaRPr b="0" lang="en-US" sz="2000" spc="-1" strike="noStrike">
+              <a:solidFill>
+                <a:srgbClr val="000000"/>
+              </a:solidFill>
+              <a:latin typeface="Arial"/>
+            </a:endParaRPr>
+          </a:p>
+          <a:p>
+            <a:pPr lvl="6" marL="3024000" indent="-216000">
+              <a:spcBef>
+                <a:spcPts val="283"/>
+              </a:spcBef>
+              <a:buClr>
+                <a:srgbClr val="000000"/>
+              </a:buClr>
+              <a:buSzPct val="45000"/>
+              <a:buFont typeface="Wingdings" charset="2"/>
+              <a:buChar char=""/>
+            </a:pPr>
+            <a:r>
+              <a:rPr b="0" lang="en-US" sz="2000" spc="-1" strike="noStrike">
+                <a:solidFill>
+                  <a:srgbClr val="000000"/>
+                </a:solidFill>
+                <a:latin typeface="Arial"/>
+              </a:rPr>
+              <a:t>Seventh Outline Level</a:t>
+            </a:r>
+            <a:endParaRPr b="0" lang="en-US" sz="2000" spc="-1" strike="noStrike">
+              <a:solidFill>
+                <a:srgbClr val="000000"/>
+              </a:solidFill>
+              <a:latin typeface="Arial"/>
             </a:endParaRPr>
           </a:p>
         </p:txBody>
@@ -3057,7 +3081,7 @@
         <p:spPr>
           <a:xfrm>
             <a:off x="4856400" y="2019600"/>
-            <a:ext cx="5115600" cy="3242520"/>
+            <a:ext cx="5115240" cy="3242160"/>
           </a:xfrm>
           <a:prstGeom prst="rect">
             <a:avLst/>
@@ -3076,7 +3100,7 @@
         <p:spPr>
           <a:xfrm>
             <a:off x="-749520" y="-831960"/>
-            <a:ext cx="2207160" cy="2203560"/>
+            <a:ext cx="2206800" cy="2203200"/>
           </a:xfrm>
           <a:prstGeom prst="ellipse">
             <a:avLst/>
@@ -3107,11 +3131,17 @@
             <a:noAutofit/>
           </a:bodyPr>
           <a:p>
+            <a:pPr>
+              <a:lnSpc>
+                <a:spcPct val="100000"/>
+              </a:lnSpc>
+            </a:pPr>
             <a:endParaRPr b="0" lang="en-US" sz="1800" spc="-1" strike="noStrike">
               <a:solidFill>
                 <a:srgbClr val="000000"/>
               </a:solidFill>
               <a:latin typeface="Arial"/>
+              <a:ea typeface="DejaVu Sans"/>
             </a:endParaRPr>
           </a:p>
         </p:txBody>
@@ -3125,7 +3155,7 @@
         <p:spPr>
           <a:xfrm>
             <a:off x="6606000" y="48600"/>
-            <a:ext cx="2165400" cy="1828800"/>
+            <a:ext cx="2165040" cy="1828440"/>
           </a:xfrm>
           <a:prstGeom prst="hexagon">
             <a:avLst>
@@ -3159,11 +3189,17 @@
             <a:noAutofit/>
           </a:bodyPr>
           <a:p>
+            <a:pPr>
+              <a:lnSpc>
+                <a:spcPct val="100000"/>
+              </a:lnSpc>
+            </a:pPr>
             <a:endParaRPr b="0" lang="en-US" sz="1800" spc="-1" strike="noStrike">
               <a:solidFill>
                 <a:srgbClr val="000000"/>
               </a:solidFill>
               <a:latin typeface="Arial"/>
+              <a:ea typeface="DejaVu Sans"/>
             </a:endParaRPr>
           </a:p>
         </p:txBody>
@@ -3177,7 +3213,7 @@
         <p:spPr>
           <a:xfrm rot="20400">
             <a:off x="5410440" y="-325080"/>
-            <a:ext cx="1552680" cy="1284120"/>
+            <a:ext cx="1552320" cy="1283760"/>
           </a:xfrm>
           <a:prstGeom prst="hexagon">
             <a:avLst>
@@ -3205,12 +3241,17 @@
             <a:noAutofit/>
           </a:bodyPr>
           <a:p>
-            <a:pPr algn="ctr"/>
+            <a:pPr algn="ctr">
+              <a:lnSpc>
+                <a:spcPct val="100000"/>
+              </a:lnSpc>
+            </a:pPr>
             <a:endParaRPr b="0" lang="en-US" sz="1800" spc="-1" strike="noStrike">
               <a:solidFill>
                 <a:srgbClr val="000000"/>
               </a:solidFill>
               <a:latin typeface="Arial"/>
+              <a:ea typeface="DejaVu Sans"/>
             </a:endParaRPr>
           </a:p>
         </p:txBody>
@@ -3223,8 +3264,8 @@
         </p:nvSpPr>
         <p:spPr>
           <a:xfrm rot="21537600">
-            <a:off x="8422200" y="964080"/>
-            <a:ext cx="1552680" cy="1284120"/>
+            <a:off x="8422200" y="963720"/>
+            <a:ext cx="1552320" cy="1283760"/>
           </a:xfrm>
           <a:prstGeom prst="hexagon">
             <a:avLst>
@@ -3251,11 +3292,17 @@
             <a:noAutofit/>
           </a:bodyPr>
           <a:p>
+            <a:pPr>
+              <a:lnSpc>
+                <a:spcPct val="100000"/>
+              </a:lnSpc>
+            </a:pPr>
             <a:endParaRPr b="0" lang="en-US" sz="1800" spc="-1" strike="noStrike">
               <a:solidFill>
                 <a:srgbClr val="000000"/>
               </a:solidFill>
               <a:latin typeface="Arial"/>
+              <a:ea typeface="DejaVu Sans"/>
             </a:endParaRPr>
           </a:p>
         </p:txBody>
@@ -3268,8 +3315,8 @@
         </p:nvSpPr>
         <p:spPr>
           <a:xfrm rot="28200">
-            <a:off x="6477840" y="1595880"/>
-            <a:ext cx="651960" cy="534240"/>
+            <a:off x="6477480" y="1595880"/>
+            <a:ext cx="651600" cy="533880"/>
           </a:xfrm>
           <a:prstGeom prst="hexagon">
             <a:avLst>
@@ -3295,11 +3342,17 @@
             <a:noAutofit/>
           </a:bodyPr>
           <a:p>
+            <a:pPr>
+              <a:lnSpc>
+                <a:spcPct val="100000"/>
+              </a:lnSpc>
+            </a:pPr>
             <a:endParaRPr b="0" lang="en-US" sz="1800" spc="-1" strike="noStrike">
               <a:solidFill>
                 <a:srgbClr val="000000"/>
               </a:solidFill>
               <a:latin typeface="Arial"/>
+              <a:ea typeface="DejaVu Sans"/>
             </a:endParaRPr>
           </a:p>
         </p:txBody>
@@ -3312,8 +3365,8 @@
         </p:nvSpPr>
         <p:spPr>
           <a:xfrm rot="42000">
-            <a:off x="8609040" y="385920"/>
-            <a:ext cx="651960" cy="534240"/>
+            <a:off x="8608680" y="385920"/>
+            <a:ext cx="651600" cy="533880"/>
           </a:xfrm>
           <a:prstGeom prst="hexagon">
             <a:avLst>
@@ -3339,11 +3392,17 @@
             <a:noAutofit/>
           </a:bodyPr>
           <a:p>
+            <a:pPr>
+              <a:lnSpc>
+                <a:spcPct val="100000"/>
+              </a:lnSpc>
+            </a:pPr>
             <a:endParaRPr b="0" lang="en-US" sz="1800" spc="-1" strike="noStrike">
               <a:solidFill>
                 <a:srgbClr val="000000"/>
               </a:solidFill>
               <a:latin typeface="Arial"/>
+              <a:ea typeface="DejaVu Sans"/>
             </a:endParaRPr>
           </a:p>
         </p:txBody>
@@ -3356,15 +3415,23 @@
         </p:nvSpPr>
         <p:spPr>
           <a:xfrm>
-            <a:off x="0" y="5257800"/>
-            <a:ext cx="10080000" cy="412200"/>
-          </a:xfrm>
-          <a:prstGeom prst="rect">
-            <a:avLst/>
-          </a:prstGeom>
-          <a:solidFill>
-            <a:srgbClr val="729fcf"/>
-          </a:solidFill>
+            <a:off x="-228600" y="5257800"/>
+            <a:ext cx="10515600" cy="685800"/>
+          </a:xfrm>
+          <a:prstGeom prst="rect">
+            <a:avLst/>
+          </a:prstGeom>
+          <a:gradFill rotWithShape="0">
+            <a:gsLst>
+              <a:gs pos="0">
+                <a:srgbClr val="35bd9c"/>
+              </a:gs>
+              <a:gs pos="100000">
+                <a:srgbClr val="0c2130"/>
+              </a:gs>
+            </a:gsLst>
+            <a:lin ang="3600000"/>
+          </a:gradFill>
           <a:ln w="0">
             <a:noFill/>
           </a:ln>
@@ -3380,11 +3447,17 @@
             <a:noAutofit/>
           </a:bodyPr>
           <a:p>
+            <a:pPr>
+              <a:lnSpc>
+                <a:spcPct val="100000"/>
+              </a:lnSpc>
+            </a:pPr>
             <a:endParaRPr b="0" lang="en-US" sz="1800" spc="-1" strike="noStrike">
               <a:solidFill>
                 <a:srgbClr val="000000"/>
               </a:solidFill>
               <a:latin typeface="Arial"/>
+              <a:ea typeface="DejaVu Sans"/>
             </a:endParaRPr>
           </a:p>
         </p:txBody>
@@ -3392,13 +3465,13 @@
       <p:sp>
         <p:nvSpPr>
           <p:cNvPr id="49" name=""/>
-          <p:cNvSpPr txBox="1"/>
-          <p:nvPr/>
-        </p:nvSpPr>
-        <p:spPr>
-          <a:xfrm>
-            <a:off x="1371600" y="2286000"/>
-            <a:ext cx="3686040" cy="346320"/>
+          <p:cNvSpPr/>
+          <p:nvPr/>
+        </p:nvSpPr>
+        <p:spPr>
+          <a:xfrm>
+            <a:off x="36000" y="2106000"/>
+            <a:ext cx="7315200" cy="345960"/>
           </a:xfrm>
           <a:prstGeom prst="rect">
             <a:avLst/>
@@ -3408,25 +3481,36 @@
             <a:noFill/>
           </a:ln>
         </p:spPr>
+        <p:style>
+          <a:lnRef idx="0"/>
+          <a:fillRef idx="0"/>
+          <a:effectRef idx="0"/>
+          <a:fontRef idx="minor"/>
+        </p:style>
         <p:txBody>
           <a:bodyPr lIns="90000" rIns="90000" tIns="45000" bIns="45000" anchor="t">
             <a:noAutofit/>
           </a:bodyPr>
           <a:p>
+            <a:pPr>
+              <a:lnSpc>
+                <a:spcPct val="100000"/>
+              </a:lnSpc>
+            </a:pPr>
             <a:r>
-              <a:rPr b="0" lang="en-US" sz="1800" spc="-1" strike="noStrike">
+              <a:rPr b="1" lang="en-US" sz="4200" spc="168" strike="noStrike">
                 <a:solidFill>
-                  <a:srgbClr val="000000"/>
+                  <a:srgbClr val="ffffff"/>
                 </a:solidFill>
-                <a:latin typeface="Arial"/>
+                <a:latin typeface="Pinchik"/>
               </a:rPr>
               <a:t>SMART ATTENDANCE PROJECT</a:t>
             </a:r>
-            <a:endParaRPr b="0" lang="en-US" sz="1800" spc="-1" strike="noStrike">
-              <a:solidFill>
-                <a:srgbClr val="000000"/>
-              </a:solidFill>
-              <a:latin typeface="Arial"/>
+            <a:endParaRPr b="1" lang="en-US" sz="4200" spc="168" strike="noStrike">
+              <a:solidFill>
+                <a:srgbClr val="ffffff"/>
+              </a:solidFill>
+              <a:latin typeface="Pinchik"/>
             </a:endParaRPr>
           </a:p>
         </p:txBody>
@@ -3434,13 +3518,13 @@
       <p:sp>
         <p:nvSpPr>
           <p:cNvPr id="50" name=""/>
-          <p:cNvSpPr txBox="1"/>
-          <p:nvPr/>
-        </p:nvSpPr>
-        <p:spPr>
-          <a:xfrm>
-            <a:off x="2514600" y="3200400"/>
-            <a:ext cx="2564280" cy="346320"/>
+          <p:cNvSpPr/>
+          <p:nvPr/>
+        </p:nvSpPr>
+        <p:spPr>
+          <a:xfrm>
+            <a:off x="745200" y="3367800"/>
+            <a:ext cx="4800600" cy="345960"/>
           </a:xfrm>
           <a:prstGeom prst="rect">
             <a:avLst/>
@@ -3450,25 +3534,36 @@
             <a:noFill/>
           </a:ln>
         </p:spPr>
+        <p:style>
+          <a:lnRef idx="0"/>
+          <a:fillRef idx="0"/>
+          <a:effectRef idx="0"/>
+          <a:fontRef idx="minor"/>
+        </p:style>
         <p:txBody>
           <a:bodyPr lIns="90000" rIns="90000" tIns="45000" bIns="45000" anchor="t">
             <a:noAutofit/>
           </a:bodyPr>
           <a:p>
+            <a:pPr>
+              <a:lnSpc>
+                <a:spcPct val="100000"/>
+              </a:lnSpc>
+            </a:pPr>
             <a:r>
-              <a:rPr b="0" lang="en-US" sz="1800" spc="-1" strike="noStrike">
+              <a:rPr b="1" lang="en-US" sz="3600" spc="-1" strike="noStrike">
                 <a:solidFill>
-                  <a:srgbClr val="000000"/>
+                  <a:srgbClr val="0c2130"/>
                 </a:solidFill>
-                <a:latin typeface="Arial"/>
+                <a:latin typeface="Lequire Rounded"/>
               </a:rPr>
               <a:t>PROJECT PROPOSAL</a:t>
             </a:r>
-            <a:endParaRPr b="0" lang="en-US" sz="1800" spc="-1" strike="noStrike">
-              <a:solidFill>
-                <a:srgbClr val="000000"/>
-              </a:solidFill>
-              <a:latin typeface="Arial"/>
+            <a:endParaRPr b="1" lang="en-US" sz="3600" spc="-1" strike="noStrike">
+              <a:solidFill>
+                <a:srgbClr val="0c2130"/>
+              </a:solidFill>
+              <a:latin typeface="Lequire Rounded"/>
             </a:endParaRPr>
           </a:p>
         </p:txBody>
@@ -3527,7 +3622,7 @@
         <p:spPr>
           <a:xfrm>
             <a:off x="-749520" y="-831960"/>
-            <a:ext cx="2207160" cy="2203560"/>
+            <a:ext cx="2206800" cy="2203200"/>
           </a:xfrm>
           <a:prstGeom prst="ellipse">
             <a:avLst/>
@@ -3558,11 +3653,17 @@
             <a:noAutofit/>
           </a:bodyPr>
           <a:p>
+            <a:pPr>
+              <a:lnSpc>
+                <a:spcPct val="100000"/>
+              </a:lnSpc>
+            </a:pPr>
             <a:endParaRPr b="0" lang="en-US" sz="1800" spc="-1" strike="noStrike">
               <a:solidFill>
                 <a:srgbClr val="000000"/>
               </a:solidFill>
               <a:latin typeface="Arial"/>
+              <a:ea typeface="DejaVu Sans"/>
             </a:endParaRPr>
           </a:p>
         </p:txBody>
@@ -3576,7 +3677,7 @@
         <p:spPr>
           <a:xfrm>
             <a:off x="6606000" y="48600"/>
-            <a:ext cx="2165400" cy="1828800"/>
+            <a:ext cx="2165040" cy="1828440"/>
           </a:xfrm>
           <a:prstGeom prst="hexagon">
             <a:avLst>
@@ -3610,11 +3711,17 @@
             <a:noAutofit/>
           </a:bodyPr>
           <a:p>
+            <a:pPr>
+              <a:lnSpc>
+                <a:spcPct val="100000"/>
+              </a:lnSpc>
+            </a:pPr>
             <a:endParaRPr b="0" lang="en-US" sz="1800" spc="-1" strike="noStrike">
               <a:solidFill>
                 <a:srgbClr val="000000"/>
               </a:solidFill>
               <a:latin typeface="Arial"/>
+              <a:ea typeface="DejaVu Sans"/>
             </a:endParaRPr>
           </a:p>
         </p:txBody>
@@ -3628,7 +3735,7 @@
         <p:spPr>
           <a:xfrm rot="20400">
             <a:off x="5410440" y="-325080"/>
-            <a:ext cx="1552680" cy="1284120"/>
+            <a:ext cx="1552320" cy="1283760"/>
           </a:xfrm>
           <a:prstGeom prst="hexagon">
             <a:avLst>
@@ -3656,11 +3763,17 @@
             <a:noAutofit/>
           </a:bodyPr>
           <a:p>
+            <a:pPr>
+              <a:lnSpc>
+                <a:spcPct val="100000"/>
+              </a:lnSpc>
+            </a:pPr>
             <a:endParaRPr b="0" lang="en-US" sz="1800" spc="-1" strike="noStrike">
               <a:solidFill>
                 <a:srgbClr val="000000"/>
               </a:solidFill>
               <a:latin typeface="Arial"/>
+              <a:ea typeface="DejaVu Sans"/>
             </a:endParaRPr>
           </a:p>
         </p:txBody>
@@ -3673,8 +3786,8 @@
         </p:nvSpPr>
         <p:spPr>
           <a:xfrm rot="21537600">
-            <a:off x="8422200" y="964080"/>
-            <a:ext cx="1552680" cy="1284120"/>
+            <a:off x="8422200" y="963720"/>
+            <a:ext cx="1552320" cy="1283760"/>
           </a:xfrm>
           <a:prstGeom prst="hexagon">
             <a:avLst>
@@ -3701,11 +3814,17 @@
             <a:noAutofit/>
           </a:bodyPr>
           <a:p>
+            <a:pPr>
+              <a:lnSpc>
+                <a:spcPct val="100000"/>
+              </a:lnSpc>
+            </a:pPr>
             <a:endParaRPr b="0" lang="en-US" sz="1800" spc="-1" strike="noStrike">
               <a:solidFill>
                 <a:srgbClr val="000000"/>
               </a:solidFill>
               <a:latin typeface="Arial"/>
+              <a:ea typeface="DejaVu Sans"/>
             </a:endParaRPr>
           </a:p>
         </p:txBody>
@@ -3718,8 +3837,8 @@
         </p:nvSpPr>
         <p:spPr>
           <a:xfrm rot="28200">
-            <a:off x="6477840" y="1595880"/>
-            <a:ext cx="651960" cy="534240"/>
+            <a:off x="6477480" y="1595880"/>
+            <a:ext cx="651600" cy="533880"/>
           </a:xfrm>
           <a:prstGeom prst="hexagon">
             <a:avLst>
@@ -3745,11 +3864,17 @@
             <a:noAutofit/>
           </a:bodyPr>
           <a:p>
+            <a:pPr>
+              <a:lnSpc>
+                <a:spcPct val="100000"/>
+              </a:lnSpc>
+            </a:pPr>
             <a:endParaRPr b="0" lang="en-US" sz="1800" spc="-1" strike="noStrike">
               <a:solidFill>
                 <a:srgbClr val="000000"/>
               </a:solidFill>
               <a:latin typeface="Arial"/>
+              <a:ea typeface="DejaVu Sans"/>
             </a:endParaRPr>
           </a:p>
         </p:txBody>
@@ -3762,8 +3887,8 @@
         </p:nvSpPr>
         <p:spPr>
           <a:xfrm rot="42000">
-            <a:off x="8609040" y="385920"/>
-            <a:ext cx="651960" cy="534240"/>
+            <a:off x="8608680" y="385920"/>
+            <a:ext cx="651600" cy="533880"/>
           </a:xfrm>
           <a:prstGeom prst="hexagon">
             <a:avLst>
@@ -3789,11 +3914,17 @@
             <a:noAutofit/>
           </a:bodyPr>
           <a:p>
+            <a:pPr>
+              <a:lnSpc>
+                <a:spcPct val="100000"/>
+              </a:lnSpc>
+            </a:pPr>
             <a:endParaRPr b="0" lang="en-US" sz="1800" spc="-1" strike="noStrike">
               <a:solidFill>
                 <a:srgbClr val="000000"/>
               </a:solidFill>
               <a:latin typeface="Arial"/>
+              <a:ea typeface="DejaVu Sans"/>
             </a:endParaRPr>
           </a:p>
         </p:txBody>
@@ -3806,15 +3937,23 @@
         </p:nvSpPr>
         <p:spPr>
           <a:xfrm>
-            <a:off x="0" y="5257800"/>
-            <a:ext cx="10080000" cy="412200"/>
-          </a:xfrm>
-          <a:prstGeom prst="rect">
-            <a:avLst/>
-          </a:prstGeom>
-          <a:solidFill>
-            <a:srgbClr val="729fcf"/>
-          </a:solidFill>
+            <a:off x="-228600" y="5257800"/>
+            <a:ext cx="10515600" cy="685800"/>
+          </a:xfrm>
+          <a:prstGeom prst="rect">
+            <a:avLst/>
+          </a:prstGeom>
+          <a:gradFill rotWithShape="0">
+            <a:gsLst>
+              <a:gs pos="0">
+                <a:srgbClr val="35bd9c"/>
+              </a:gs>
+              <a:gs pos="100000">
+                <a:srgbClr val="0c2130"/>
+              </a:gs>
+            </a:gsLst>
+            <a:lin ang="3600000"/>
+          </a:gradFill>
           <a:ln w="0">
             <a:noFill/>
           </a:ln>
@@ -3830,48 +3969,31 @@
             <a:noAutofit/>
           </a:bodyPr>
           <a:p>
+            <a:pPr>
+              <a:lnSpc>
+                <a:spcPct val="100000"/>
+              </a:lnSpc>
+            </a:pPr>
             <a:endParaRPr b="0" lang="en-US" sz="1800" spc="-1" strike="noStrike">
               <a:solidFill>
                 <a:srgbClr val="000000"/>
               </a:solidFill>
               <a:latin typeface="Arial"/>
-            </a:endParaRPr>
-          </a:p>
-        </p:txBody>
-      </p:sp>
-      <p:pic>
-        <p:nvPicPr>
-          <p:cNvPr id="58" name="" descr=""/>
-          <p:cNvPicPr/>
-          <p:nvPr/>
-        </p:nvPicPr>
-        <p:blipFill>
-          <a:blip r:embed="rId1"/>
-          <a:stretch/>
-        </p:blipFill>
-        <p:spPr>
-          <a:xfrm>
-            <a:off x="0" y="643320"/>
-            <a:ext cx="5029200" cy="5029200"/>
-          </a:xfrm>
-          <a:prstGeom prst="rect">
-            <a:avLst/>
-          </a:prstGeom>
-          <a:ln w="0">
-            <a:noFill/>
-          </a:ln>
-        </p:spPr>
-      </p:pic>
-      <p:sp>
-        <p:nvSpPr>
-          <p:cNvPr id="59" name=""/>
-          <p:cNvSpPr txBox="1"/>
+              <a:ea typeface="DejaVu Sans"/>
+            </a:endParaRPr>
+          </a:p>
+        </p:txBody>
+      </p:sp>
+      <p:sp>
+        <p:nvSpPr>
+          <p:cNvPr id="58" name=""/>
+          <p:cNvSpPr/>
           <p:nvPr/>
         </p:nvSpPr>
         <p:spPr>
           <a:xfrm>
             <a:off x="5790960" y="2514600"/>
-            <a:ext cx="1259640" cy="346320"/>
+            <a:ext cx="1259280" cy="345960"/>
           </a:xfrm>
           <a:prstGeom prst="rect">
             <a:avLst/>
@@ -3881,11 +4003,22 @@
             <a:noFill/>
           </a:ln>
         </p:spPr>
+        <p:style>
+          <a:lnRef idx="0"/>
+          <a:fillRef idx="0"/>
+          <a:effectRef idx="0"/>
+          <a:fontRef idx="minor"/>
+        </p:style>
         <p:txBody>
           <a:bodyPr lIns="90000" rIns="90000" tIns="45000" bIns="45000" anchor="t">
             <a:noAutofit/>
           </a:bodyPr>
           <a:p>
+            <a:pPr>
+              <a:lnSpc>
+                <a:spcPct val="100000"/>
+              </a:lnSpc>
+            </a:pPr>
             <a:r>
               <a:rPr b="0" lang="en-US" sz="1800" spc="-1" strike="noStrike">
                 <a:solidFill>
@@ -3906,14 +4039,14 @@
       </p:sp>
       <p:sp>
         <p:nvSpPr>
-          <p:cNvPr id="60" name=""/>
-          <p:cNvSpPr txBox="1"/>
+          <p:cNvPr id="59" name=""/>
+          <p:cNvSpPr/>
           <p:nvPr/>
         </p:nvSpPr>
         <p:spPr>
           <a:xfrm>
             <a:off x="5029200" y="2971800"/>
-            <a:ext cx="2847600" cy="346320"/>
+            <a:ext cx="2847240" cy="345960"/>
           </a:xfrm>
           <a:prstGeom prst="rect">
             <a:avLst/>
@@ -3923,11 +4056,22 @@
             <a:noFill/>
           </a:ln>
         </p:spPr>
+        <p:style>
+          <a:lnRef idx="0"/>
+          <a:fillRef idx="0"/>
+          <a:effectRef idx="0"/>
+          <a:fontRef idx="minor"/>
+        </p:style>
         <p:txBody>
           <a:bodyPr lIns="90000" rIns="90000" tIns="45000" bIns="45000" anchor="t">
             <a:noAutofit/>
           </a:bodyPr>
           <a:p>
+            <a:pPr>
+              <a:lnSpc>
+                <a:spcPct val="100000"/>
+              </a:lnSpc>
+            </a:pPr>
             <a:r>
               <a:rPr b="0" lang="en-US" sz="1800" spc="-1" strike="noStrike">
                 <a:solidFill>
@@ -3948,14 +4092,14 @@
       </p:sp>
       <p:sp>
         <p:nvSpPr>
-          <p:cNvPr id="61" name=""/>
-          <p:cNvSpPr txBox="1"/>
+          <p:cNvPr id="60" name=""/>
+          <p:cNvSpPr/>
           <p:nvPr/>
         </p:nvSpPr>
         <p:spPr>
           <a:xfrm>
             <a:off x="5691240" y="3657600"/>
-            <a:ext cx="1166760" cy="346320"/>
+            <a:ext cx="1166400" cy="345960"/>
           </a:xfrm>
           <a:prstGeom prst="rect">
             <a:avLst/>
@@ -3965,11 +4109,22 @@
             <a:noFill/>
           </a:ln>
         </p:spPr>
+        <p:style>
+          <a:lnRef idx="0"/>
+          <a:fillRef idx="0"/>
+          <a:effectRef idx="0"/>
+          <a:fontRef idx="minor"/>
+        </p:style>
         <p:txBody>
           <a:bodyPr lIns="90000" rIns="90000" tIns="45000" bIns="45000" anchor="t">
             <a:noAutofit/>
           </a:bodyPr>
           <a:p>
+            <a:pPr>
+              <a:lnSpc>
+                <a:spcPct val="100000"/>
+              </a:lnSpc>
+            </a:pPr>
             <a:r>
               <a:rPr b="0" lang="en-US" sz="1800" spc="-1" strike="noStrike">
                 <a:solidFill>
@@ -3990,14 +4145,14 @@
       </p:sp>
       <p:sp>
         <p:nvSpPr>
-          <p:cNvPr id="62" name=""/>
-          <p:cNvSpPr txBox="1"/>
+          <p:cNvPr id="61" name=""/>
+          <p:cNvSpPr/>
           <p:nvPr/>
         </p:nvSpPr>
         <p:spPr>
           <a:xfrm>
             <a:off x="5470200" y="4114800"/>
-            <a:ext cx="1845000" cy="346320"/>
+            <a:ext cx="1844640" cy="345960"/>
           </a:xfrm>
           <a:prstGeom prst="rect">
             <a:avLst/>
@@ -4007,11 +4162,22 @@
             <a:noFill/>
           </a:ln>
         </p:spPr>
+        <p:style>
+          <a:lnRef idx="0"/>
+          <a:fillRef idx="0"/>
+          <a:effectRef idx="0"/>
+          <a:fontRef idx="minor"/>
+        </p:style>
         <p:txBody>
           <a:bodyPr lIns="90000" rIns="90000" tIns="45000" bIns="45000" anchor="t">
             <a:noAutofit/>
           </a:bodyPr>
           <a:p>
+            <a:pPr>
+              <a:lnSpc>
+                <a:spcPct val="100000"/>
+              </a:lnSpc>
+            </a:pPr>
             <a:r>
               <a:rPr b="0" lang="en-US" sz="1800" spc="-1" strike="noStrike">
                 <a:solidFill>
@@ -4030,6 +4196,29 @@
           </a:p>
         </p:txBody>
       </p:sp>
+      <p:pic>
+        <p:nvPicPr>
+          <p:cNvPr id="62" name="" descr=""/>
+          <p:cNvPicPr/>
+          <p:nvPr/>
+        </p:nvPicPr>
+        <p:blipFill>
+          <a:blip r:embed="rId1"/>
+          <a:stretch/>
+        </p:blipFill>
+        <p:spPr>
+          <a:xfrm>
+            <a:off x="-626760" y="203400"/>
+            <a:ext cx="5670360" cy="5670360"/>
+          </a:xfrm>
+          <a:prstGeom prst="rect">
+            <a:avLst/>
+          </a:prstGeom>
+          <a:ln w="0">
+            <a:noFill/>
+          </a:ln>
+        </p:spPr>
+      </p:pic>
     </p:spTree>
   </p:cSld>
   <mc:AlternateContent>
@@ -4084,7 +4273,7 @@
         <p:spPr>
           <a:xfrm>
             <a:off x="-749520" y="-831960"/>
-            <a:ext cx="2207160" cy="2203560"/>
+            <a:ext cx="2206800" cy="2203200"/>
           </a:xfrm>
           <a:prstGeom prst="ellipse">
             <a:avLst/>
@@ -4115,11 +4304,17 @@
             <a:noAutofit/>
           </a:bodyPr>
           <a:p>
+            <a:pPr>
+              <a:lnSpc>
+                <a:spcPct val="100000"/>
+              </a:lnSpc>
+            </a:pPr>
             <a:endParaRPr b="0" lang="en-US" sz="1800" spc="-1" strike="noStrike">
               <a:solidFill>
                 <a:srgbClr val="000000"/>
               </a:solidFill>
               <a:latin typeface="Arial"/>
+              <a:ea typeface="DejaVu Sans"/>
             </a:endParaRPr>
           </a:p>
         </p:txBody>
@@ -4133,7 +4328,7 @@
         <p:spPr>
           <a:xfrm>
             <a:off x="6606000" y="48600"/>
-            <a:ext cx="2165400" cy="1828800"/>
+            <a:ext cx="2165040" cy="1828440"/>
           </a:xfrm>
           <a:prstGeom prst="hexagon">
             <a:avLst>
@@ -4167,11 +4362,17 @@
             <a:noAutofit/>
           </a:bodyPr>
           <a:p>
+            <a:pPr>
+              <a:lnSpc>
+                <a:spcPct val="100000"/>
+              </a:lnSpc>
+            </a:pPr>
             <a:endParaRPr b="0" lang="en-US" sz="1800" spc="-1" strike="noStrike">
               <a:solidFill>
                 <a:srgbClr val="000000"/>
               </a:solidFill>
               <a:latin typeface="Arial"/>
+              <a:ea typeface="DejaVu Sans"/>
             </a:endParaRPr>
           </a:p>
         </p:txBody>
@@ -4185,7 +4386,7 @@
         <p:spPr>
           <a:xfrm rot="20400">
             <a:off x="5410440" y="-325080"/>
-            <a:ext cx="1552680" cy="1284120"/>
+            <a:ext cx="1552320" cy="1283760"/>
           </a:xfrm>
           <a:prstGeom prst="hexagon">
             <a:avLst>
@@ -4213,11 +4414,17 @@
             <a:noAutofit/>
           </a:bodyPr>
           <a:p>
+            <a:pPr>
+              <a:lnSpc>
+                <a:spcPct val="100000"/>
+              </a:lnSpc>
+            </a:pPr>
             <a:endParaRPr b="0" lang="en-US" sz="1800" spc="-1" strike="noStrike">
               <a:solidFill>
                 <a:srgbClr val="000000"/>
               </a:solidFill>
               <a:latin typeface="Arial"/>
+              <a:ea typeface="DejaVu Sans"/>
             </a:endParaRPr>
           </a:p>
         </p:txBody>
@@ -4230,8 +4437,8 @@
         </p:nvSpPr>
         <p:spPr>
           <a:xfrm rot="21537600">
-            <a:off x="8422200" y="964080"/>
-            <a:ext cx="1552680" cy="1284120"/>
+            <a:off x="8422200" y="963720"/>
+            <a:ext cx="1552320" cy="1283760"/>
           </a:xfrm>
           <a:prstGeom prst="hexagon">
             <a:avLst>
@@ -4258,11 +4465,17 @@
             <a:noAutofit/>
           </a:bodyPr>
           <a:p>
+            <a:pPr>
+              <a:lnSpc>
+                <a:spcPct val="100000"/>
+              </a:lnSpc>
+            </a:pPr>
             <a:endParaRPr b="0" lang="en-US" sz="1800" spc="-1" strike="noStrike">
               <a:solidFill>
                 <a:srgbClr val="000000"/>
               </a:solidFill>
               <a:latin typeface="Arial"/>
+              <a:ea typeface="DejaVu Sans"/>
             </a:endParaRPr>
           </a:p>
         </p:txBody>
@@ -4275,8 +4488,8 @@
         </p:nvSpPr>
         <p:spPr>
           <a:xfrm rot="28200">
-            <a:off x="6477840" y="1595880"/>
-            <a:ext cx="651960" cy="534240"/>
+            <a:off x="6477480" y="1595880"/>
+            <a:ext cx="651600" cy="533880"/>
           </a:xfrm>
           <a:prstGeom prst="hexagon">
             <a:avLst>
@@ -4302,11 +4515,17 @@
             <a:noAutofit/>
           </a:bodyPr>
           <a:p>
+            <a:pPr>
+              <a:lnSpc>
+                <a:spcPct val="100000"/>
+              </a:lnSpc>
+            </a:pPr>
             <a:endParaRPr b="0" lang="en-US" sz="1800" spc="-1" strike="noStrike">
               <a:solidFill>
                 <a:srgbClr val="000000"/>
               </a:solidFill>
               <a:latin typeface="Arial"/>
+              <a:ea typeface="DejaVu Sans"/>
             </a:endParaRPr>
           </a:p>
         </p:txBody>
@@ -4319,8 +4538,8 @@
         </p:nvSpPr>
         <p:spPr>
           <a:xfrm rot="42000">
-            <a:off x="8609040" y="385920"/>
-            <a:ext cx="651960" cy="534240"/>
+            <a:off x="8608680" y="385920"/>
+            <a:ext cx="651600" cy="533880"/>
           </a:xfrm>
           <a:prstGeom prst="hexagon">
             <a:avLst>
@@ -4346,11 +4565,17 @@
             <a:noAutofit/>
           </a:bodyPr>
           <a:p>
+            <a:pPr>
+              <a:lnSpc>
+                <a:spcPct val="100000"/>
+              </a:lnSpc>
+            </a:pPr>
             <a:endParaRPr b="0" lang="en-US" sz="1800" spc="-1" strike="noStrike">
               <a:solidFill>
                 <a:srgbClr val="000000"/>
               </a:solidFill>
               <a:latin typeface="Arial"/>
+              <a:ea typeface="DejaVu Sans"/>
             </a:endParaRPr>
           </a:p>
         </p:txBody>
@@ -4363,15 +4588,13 @@
         </p:nvSpPr>
         <p:spPr>
           <a:xfrm>
-            <a:off x="0" y="5257800"/>
-            <a:ext cx="10080000" cy="412200"/>
-          </a:xfrm>
-          <a:prstGeom prst="rect">
-            <a:avLst/>
-          </a:prstGeom>
-          <a:solidFill>
-            <a:srgbClr val="729fcf"/>
-          </a:solidFill>
+            <a:off x="2286000" y="1159920"/>
+            <a:ext cx="4763160" cy="345960"/>
+          </a:xfrm>
+          <a:prstGeom prst="rect">
+            <a:avLst/>
+          </a:prstGeom>
+          <a:noFill/>
           <a:ln w="0">
             <a:noFill/>
           </a:ln>
@@ -4383,82 +4606,60 @@
           <a:fontRef idx="minor"/>
         </p:style>
         <p:txBody>
-          <a:bodyPr lIns="90000" rIns="90000" tIns="45000" bIns="45000" anchor="ctr">
-            <a:noAutofit/>
-          </a:bodyPr>
-          <a:p>
-            <a:endParaRPr b="0" lang="en-US" sz="1800" spc="-1" strike="noStrike">
-              <a:solidFill>
-                <a:srgbClr val="000000"/>
-              </a:solidFill>
-              <a:latin typeface="Arial"/>
-            </a:endParaRPr>
-          </a:p>
-        </p:txBody>
-      </p:sp>
-      <p:sp>
-        <p:nvSpPr>
-          <p:cNvPr id="70" name=""/>
-          <p:cNvSpPr txBox="1"/>
-          <p:nvPr/>
-        </p:nvSpPr>
-        <p:spPr>
-          <a:xfrm>
-            <a:off x="3785040" y="950400"/>
-            <a:ext cx="2437920" cy="346320"/>
-          </a:xfrm>
-          <a:prstGeom prst="rect">
-            <a:avLst/>
-          </a:prstGeom>
-          <a:noFill/>
-          <a:ln w="0">
-            <a:noFill/>
-          </a:ln>
-        </p:spPr>
-        <p:txBody>
           <a:bodyPr lIns="90000" rIns="90000" tIns="45000" bIns="45000" anchor="t">
             <a:noAutofit/>
           </a:bodyPr>
           <a:p>
+            <a:pPr>
+              <a:lnSpc>
+                <a:spcPct val="100000"/>
+              </a:lnSpc>
+            </a:pPr>
             <a:r>
-              <a:rPr b="0" lang="en-US" sz="1800" spc="-1" strike="noStrike">
+              <a:rPr b="1" lang="en-US" sz="3200" spc="-1" strike="noStrike">
                 <a:solidFill>
                   <a:srgbClr val="000000"/>
                 </a:solidFill>
-                <a:latin typeface="Arial"/>
+                <a:latin typeface="Quicksand"/>
               </a:rPr>
               <a:t>TABLE OF CONTENT</a:t>
             </a:r>
-            <a:endParaRPr b="0" lang="en-US" sz="1800" spc="-1" strike="noStrike">
-              <a:solidFill>
-                <a:srgbClr val="000000"/>
-              </a:solidFill>
-              <a:latin typeface="Arial"/>
-            </a:endParaRPr>
-          </a:p>
-        </p:txBody>
-      </p:sp>
-      <p:sp>
-        <p:nvSpPr>
-          <p:cNvPr id="71" name=""/>
+            <a:endParaRPr b="1" lang="en-US" sz="3200" spc="-1" strike="noStrike">
+              <a:solidFill>
+                <a:srgbClr val="000000"/>
+              </a:solidFill>
+              <a:latin typeface="Quicksand"/>
+            </a:endParaRPr>
+          </a:p>
+        </p:txBody>
+      </p:sp>
+      <p:sp>
+        <p:nvSpPr>
+          <p:cNvPr id="70" name=""/>
           <p:cNvSpPr/>
           <p:nvPr/>
         </p:nvSpPr>
         <p:spPr>
           <a:xfrm>
             <a:off x="399960" y="2743200"/>
-            <a:ext cx="2800440" cy="2514600"/>
-          </a:xfrm>
-          <a:prstGeom prst="rect">
-            <a:avLst/>
-          </a:prstGeom>
-          <a:solidFill>
-            <a:srgbClr val="729fcf"/>
-          </a:solidFill>
-          <a:ln w="0">
-            <a:solidFill>
-              <a:srgbClr val="3465a4"/>
-            </a:solidFill>
+            <a:ext cx="2800080" cy="2514240"/>
+          </a:xfrm>
+          <a:prstGeom prst="rect">
+            <a:avLst/>
+          </a:prstGeom>
+          <a:gradFill rotWithShape="0">
+            <a:gsLst>
+              <a:gs pos="0">
+                <a:srgbClr val="cccccc"/>
+              </a:gs>
+              <a:gs pos="100000">
+                <a:srgbClr val="35bd9c"/>
+              </a:gs>
+            </a:gsLst>
+            <a:lin ang="3600000"/>
+          </a:gradFill>
+          <a:ln w="0">
+            <a:noFill/>
           </a:ln>
         </p:spPr>
         <p:style>
@@ -4472,36 +4673,48 @@
             <a:noAutofit/>
           </a:bodyPr>
           <a:p>
+            <a:pPr>
+              <a:lnSpc>
+                <a:spcPct val="100000"/>
+              </a:lnSpc>
+            </a:pPr>
             <a:endParaRPr b="0" lang="en-US" sz="1800" spc="-1" strike="noStrike">
               <a:solidFill>
                 <a:srgbClr val="000000"/>
               </a:solidFill>
               <a:latin typeface="Arial"/>
-            </a:endParaRPr>
-          </a:p>
-        </p:txBody>
-      </p:sp>
-      <p:sp>
-        <p:nvSpPr>
-          <p:cNvPr id="72" name=""/>
+              <a:ea typeface="DejaVu Sans"/>
+            </a:endParaRPr>
+          </a:p>
+        </p:txBody>
+      </p:sp>
+      <p:sp>
+        <p:nvSpPr>
+          <p:cNvPr id="71" name=""/>
           <p:cNvSpPr/>
           <p:nvPr/>
         </p:nvSpPr>
         <p:spPr>
           <a:xfrm>
             <a:off x="3514680" y="2743200"/>
-            <a:ext cx="2800440" cy="2514600"/>
-          </a:xfrm>
-          <a:prstGeom prst="rect">
-            <a:avLst/>
-          </a:prstGeom>
-          <a:solidFill>
-            <a:srgbClr val="729fcf"/>
-          </a:solidFill>
-          <a:ln w="0">
-            <a:solidFill>
-              <a:srgbClr val="3465a4"/>
-            </a:solidFill>
+            <a:ext cx="2800080" cy="2514240"/>
+          </a:xfrm>
+          <a:prstGeom prst="rect">
+            <a:avLst/>
+          </a:prstGeom>
+          <a:gradFill rotWithShape="0">
+            <a:gsLst>
+              <a:gs pos="0">
+                <a:srgbClr val="cccccc"/>
+              </a:gs>
+              <a:gs pos="100000">
+                <a:srgbClr val="35bd9c"/>
+              </a:gs>
+            </a:gsLst>
+            <a:lin ang="3600000"/>
+          </a:gradFill>
+          <a:ln w="0">
+            <a:noFill/>
           </a:ln>
         </p:spPr>
         <p:style>
@@ -4515,36 +4728,48 @@
             <a:noAutofit/>
           </a:bodyPr>
           <a:p>
+            <a:pPr>
+              <a:lnSpc>
+                <a:spcPct val="100000"/>
+              </a:lnSpc>
+            </a:pPr>
             <a:endParaRPr b="0" lang="en-US" sz="1800" spc="-1" strike="noStrike">
               <a:solidFill>
                 <a:srgbClr val="000000"/>
               </a:solidFill>
               <a:latin typeface="Arial"/>
-            </a:endParaRPr>
-          </a:p>
-        </p:txBody>
-      </p:sp>
-      <p:sp>
-        <p:nvSpPr>
-          <p:cNvPr id="73" name=""/>
+              <a:ea typeface="DejaVu Sans"/>
+            </a:endParaRPr>
+          </a:p>
+        </p:txBody>
+      </p:sp>
+      <p:sp>
+        <p:nvSpPr>
+          <p:cNvPr id="72" name=""/>
           <p:cNvSpPr/>
           <p:nvPr/>
         </p:nvSpPr>
         <p:spPr>
           <a:xfrm>
             <a:off x="6629400" y="2743200"/>
-            <a:ext cx="2800440" cy="2514600"/>
-          </a:xfrm>
-          <a:prstGeom prst="rect">
-            <a:avLst/>
-          </a:prstGeom>
-          <a:solidFill>
-            <a:srgbClr val="729fcf"/>
-          </a:solidFill>
-          <a:ln w="0">
-            <a:solidFill>
-              <a:srgbClr val="3465a4"/>
-            </a:solidFill>
+            <a:ext cx="2800080" cy="2514240"/>
+          </a:xfrm>
+          <a:prstGeom prst="rect">
+            <a:avLst/>
+          </a:prstGeom>
+          <a:gradFill rotWithShape="0">
+            <a:gsLst>
+              <a:gs pos="0">
+                <a:srgbClr val="cccccc"/>
+              </a:gs>
+              <a:gs pos="100000">
+                <a:srgbClr val="35bd9c"/>
+              </a:gs>
+            </a:gsLst>
+            <a:lin ang="3600000"/>
+          </a:gradFill>
+          <a:ln w="0">
+            <a:noFill/>
           </a:ln>
         </p:spPr>
         <p:style>
@@ -4558,15 +4783,1146 @@
             <a:noAutofit/>
           </a:bodyPr>
           <a:p>
+            <a:pPr>
+              <a:lnSpc>
+                <a:spcPct val="100000"/>
+              </a:lnSpc>
+            </a:pPr>
             <a:endParaRPr b="0" lang="en-US" sz="1800" spc="-1" strike="noStrike">
               <a:solidFill>
                 <a:srgbClr val="000000"/>
               </a:solidFill>
               <a:latin typeface="Arial"/>
-            </a:endParaRPr>
-          </a:p>
-        </p:txBody>
-      </p:sp>
+              <a:ea typeface="DejaVu Sans"/>
+            </a:endParaRPr>
+          </a:p>
+        </p:txBody>
+      </p:sp>
+      <p:sp>
+        <p:nvSpPr>
+          <p:cNvPr id="73" name=""/>
+          <p:cNvSpPr/>
+          <p:nvPr/>
+        </p:nvSpPr>
+        <p:spPr>
+          <a:xfrm>
+            <a:off x="9630000" y="5166000"/>
+            <a:ext cx="657000" cy="657000"/>
+          </a:xfrm>
+          <a:prstGeom prst="ellipse">
+            <a:avLst/>
+          </a:prstGeom>
+          <a:gradFill rotWithShape="0">
+            <a:gsLst>
+              <a:gs pos="0">
+                <a:srgbClr val="35bd9c">
+                  <a:alpha val="95294"/>
+                </a:srgbClr>
+              </a:gs>
+              <a:gs pos="100000">
+                <a:srgbClr val="0c2130">
+                  <a:alpha val="95294"/>
+                </a:srgbClr>
+              </a:gs>
+            </a:gsLst>
+            <a:lin ang="0"/>
+          </a:gradFill>
+          <a:ln w="0">
+            <a:noFill/>
+          </a:ln>
+        </p:spPr>
+        <p:style>
+          <a:lnRef idx="0"/>
+          <a:fillRef idx="0"/>
+          <a:effectRef idx="0"/>
+          <a:fontRef idx="minor"/>
+        </p:style>
+        <p:txBody>
+          <a:bodyPr lIns="90000" rIns="90000" tIns="45000" bIns="45000" anchor="ctr">
+            <a:noAutofit/>
+          </a:bodyPr>
+          <a:p>
+            <a:pPr algn="ctr"/>
+            <a:r>
+              <a:rPr b="1" lang="en-US" sz="1800" spc="-1" strike="noStrike">
+                <a:solidFill>
+                  <a:srgbClr val="ffffff"/>
+                </a:solidFill>
+                <a:latin typeface="Lequire Rounded"/>
+              </a:rPr>
+              <a:t>3</a:t>
+            </a:r>
+            <a:endParaRPr b="1" lang="en-US" sz="1800" spc="-1" strike="noStrike">
+              <a:solidFill>
+                <a:srgbClr val="ffffff"/>
+              </a:solidFill>
+              <a:latin typeface="Lequire Rounded"/>
+            </a:endParaRPr>
+          </a:p>
+        </p:txBody>
+      </p:sp>
+      <p:sp>
+        <p:nvSpPr>
+          <p:cNvPr id="74" name=""/>
+          <p:cNvSpPr/>
+          <p:nvPr/>
+        </p:nvSpPr>
+        <p:spPr>
+          <a:xfrm>
+            <a:off x="4464000" y="1901880"/>
+            <a:ext cx="768240" cy="768240"/>
+          </a:xfrm>
+          <a:prstGeom prst="ellipse">
+            <a:avLst/>
+          </a:prstGeom>
+          <a:noFill/>
+          <a:ln cap="rnd" w="38160">
+            <a:solidFill>
+              <a:srgbClr val="ffffff"/>
+            </a:solidFill>
+            <a:prstDash val="sysDot"/>
+            <a:round/>
+          </a:ln>
+        </p:spPr>
+        <p:style>
+          <a:lnRef idx="0"/>
+          <a:fillRef idx="0"/>
+          <a:effectRef idx="0"/>
+          <a:fontRef idx="minor"/>
+        </p:style>
+        <p:txBody>
+          <a:bodyPr lIns="109080" rIns="109080" tIns="64080" bIns="64080" anchor="ctr">
+            <a:noAutofit/>
+          </a:bodyPr>
+          <a:p>
+            <a:endParaRPr b="0" lang="en-US" sz="1800" spc="-1" strike="noStrike">
+              <a:solidFill>
+                <a:srgbClr val="000000"/>
+              </a:solidFill>
+              <a:latin typeface="Arial"/>
+            </a:endParaRPr>
+          </a:p>
+        </p:txBody>
+      </p:sp>
+      <p:pic>
+        <p:nvPicPr>
+          <p:cNvPr id="75" name="" descr=""/>
+          <p:cNvPicPr/>
+          <p:nvPr/>
+        </p:nvPicPr>
+        <p:blipFill>
+          <a:blip r:embed="rId1"/>
+          <a:stretch/>
+        </p:blipFill>
+        <p:spPr>
+          <a:xfrm>
+            <a:off x="4572000" y="1981080"/>
+            <a:ext cx="575640" cy="569520"/>
+          </a:xfrm>
+          <a:prstGeom prst="rect">
+            <a:avLst/>
+          </a:prstGeom>
+          <a:ln w="0">
+            <a:noFill/>
+          </a:ln>
+        </p:spPr>
+      </p:pic>
+      <p:sp>
+        <p:nvSpPr>
+          <p:cNvPr id="76" name=""/>
+          <p:cNvSpPr/>
+          <p:nvPr/>
+        </p:nvSpPr>
+        <p:spPr>
+          <a:xfrm>
+            <a:off x="7495200" y="1900800"/>
+            <a:ext cx="768240" cy="768240"/>
+          </a:xfrm>
+          <a:prstGeom prst="ellipse">
+            <a:avLst/>
+          </a:prstGeom>
+          <a:noFill/>
+          <a:ln cap="rnd" w="38160">
+            <a:solidFill>
+              <a:srgbClr val="ffffff"/>
+            </a:solidFill>
+            <a:prstDash val="sysDot"/>
+            <a:round/>
+          </a:ln>
+        </p:spPr>
+        <p:style>
+          <a:lnRef idx="0"/>
+          <a:fillRef idx="0"/>
+          <a:effectRef idx="0"/>
+          <a:fontRef idx="minor"/>
+        </p:style>
+        <p:txBody>
+          <a:bodyPr lIns="109080" rIns="109080" tIns="64080" bIns="64080" anchor="ctr">
+            <a:noAutofit/>
+          </a:bodyPr>
+          <a:p>
+            <a:endParaRPr b="0" lang="en-US" sz="1800" spc="-1" strike="noStrike">
+              <a:solidFill>
+                <a:srgbClr val="000000"/>
+              </a:solidFill>
+              <a:latin typeface="Arial"/>
+            </a:endParaRPr>
+          </a:p>
+        </p:txBody>
+      </p:sp>
+      <p:sp>
+        <p:nvSpPr>
+          <p:cNvPr id="77" name=""/>
+          <p:cNvSpPr/>
+          <p:nvPr/>
+        </p:nvSpPr>
+        <p:spPr>
+          <a:xfrm>
+            <a:off x="1395000" y="1901880"/>
+            <a:ext cx="768240" cy="768240"/>
+          </a:xfrm>
+          <a:prstGeom prst="ellipse">
+            <a:avLst/>
+          </a:prstGeom>
+          <a:noFill/>
+          <a:ln cap="rnd" w="38160">
+            <a:solidFill>
+              <a:srgbClr val="ffffff"/>
+            </a:solidFill>
+            <a:prstDash val="sysDot"/>
+            <a:round/>
+          </a:ln>
+        </p:spPr>
+        <p:style>
+          <a:lnRef idx="0"/>
+          <a:fillRef idx="0"/>
+          <a:effectRef idx="0"/>
+          <a:fontRef idx="minor"/>
+        </p:style>
+        <p:txBody>
+          <a:bodyPr lIns="108720" rIns="108720" tIns="63720" bIns="63720" anchor="ctr">
+            <a:noAutofit/>
+          </a:bodyPr>
+          <a:p>
+            <a:endParaRPr b="0" lang="en-US" sz="1800" spc="-1" strike="noStrike">
+              <a:solidFill>
+                <a:srgbClr val="000000"/>
+              </a:solidFill>
+              <a:latin typeface="Arial"/>
+            </a:endParaRPr>
+          </a:p>
+        </p:txBody>
+      </p:sp>
+      <p:pic>
+        <p:nvPicPr>
+          <p:cNvPr id="78" name="" descr=""/>
+          <p:cNvPicPr/>
+          <p:nvPr/>
+        </p:nvPicPr>
+        <p:blipFill>
+          <a:blip r:embed="rId2"/>
+          <a:stretch/>
+        </p:blipFill>
+        <p:spPr>
+          <a:xfrm>
+            <a:off x="1547280" y="1994760"/>
+            <a:ext cx="519120" cy="558000"/>
+          </a:xfrm>
+          <a:prstGeom prst="rect">
+            <a:avLst/>
+          </a:prstGeom>
+          <a:ln w="0">
+            <a:noFill/>
+          </a:ln>
+        </p:spPr>
+      </p:pic>
+      <p:pic>
+        <p:nvPicPr>
+          <p:cNvPr id="79" name="" descr=""/>
+          <p:cNvPicPr/>
+          <p:nvPr/>
+        </p:nvPicPr>
+        <p:blipFill>
+          <a:blip r:embed="rId3"/>
+          <a:stretch/>
+        </p:blipFill>
+        <p:spPr>
+          <a:xfrm>
+            <a:off x="7557120" y="1954080"/>
+            <a:ext cx="658080" cy="678600"/>
+          </a:xfrm>
+          <a:prstGeom prst="rect">
+            <a:avLst/>
+          </a:prstGeom>
+          <a:ln w="0">
+            <a:noFill/>
+          </a:ln>
+        </p:spPr>
+      </p:pic>
+      <p:sp>
+        <p:nvSpPr>
+          <p:cNvPr id="80" name=""/>
+          <p:cNvSpPr/>
+          <p:nvPr/>
+        </p:nvSpPr>
+        <p:spPr>
+          <a:xfrm>
+            <a:off x="601200" y="2899800"/>
+            <a:ext cx="457200" cy="457200"/>
+          </a:xfrm>
+          <a:prstGeom prst="ellipse">
+            <a:avLst/>
+          </a:prstGeom>
+          <a:gradFill rotWithShape="0">
+            <a:gsLst>
+              <a:gs pos="0">
+                <a:srgbClr val="0c2130"/>
+              </a:gs>
+              <a:gs pos="100000">
+                <a:srgbClr val="254061"/>
+              </a:gs>
+            </a:gsLst>
+            <a:lin ang="3600000"/>
+          </a:gradFill>
+          <a:ln w="0">
+            <a:noFill/>
+          </a:ln>
+        </p:spPr>
+        <p:style>
+          <a:lnRef idx="0"/>
+          <a:fillRef idx="0"/>
+          <a:effectRef idx="0"/>
+          <a:fontRef idx="minor"/>
+        </p:style>
+        <p:txBody>
+          <a:bodyPr lIns="90000" rIns="90000" tIns="45000" bIns="45000" anchor="ctr">
+            <a:noAutofit/>
+          </a:bodyPr>
+          <a:p>
+            <a:endParaRPr b="0" lang="en-US" sz="1800" spc="-1" strike="noStrike">
+              <a:solidFill>
+                <a:srgbClr val="ffffff"/>
+              </a:solidFill>
+              <a:latin typeface="Arial"/>
+            </a:endParaRPr>
+          </a:p>
+        </p:txBody>
+      </p:sp>
+      <p:sp>
+        <p:nvSpPr>
+          <p:cNvPr id="81" name=""/>
+          <p:cNvSpPr/>
+          <p:nvPr/>
+        </p:nvSpPr>
+        <p:spPr>
+          <a:xfrm>
+            <a:off x="590040" y="3497400"/>
+            <a:ext cx="457200" cy="457200"/>
+          </a:xfrm>
+          <a:prstGeom prst="ellipse">
+            <a:avLst/>
+          </a:prstGeom>
+          <a:gradFill rotWithShape="0">
+            <a:gsLst>
+              <a:gs pos="0">
+                <a:srgbClr val="0c2130"/>
+              </a:gs>
+              <a:gs pos="100000">
+                <a:srgbClr val="254061"/>
+              </a:gs>
+            </a:gsLst>
+            <a:lin ang="3600000"/>
+          </a:gradFill>
+          <a:ln w="0">
+            <a:noFill/>
+          </a:ln>
+        </p:spPr>
+        <p:style>
+          <a:lnRef idx="0"/>
+          <a:fillRef idx="0"/>
+          <a:effectRef idx="0"/>
+          <a:fontRef idx="minor"/>
+        </p:style>
+        <p:txBody>
+          <a:bodyPr lIns="90000" rIns="90000" tIns="45000" bIns="45000" anchor="ctr">
+            <a:noAutofit/>
+          </a:bodyPr>
+          <a:p>
+            <a:endParaRPr b="0" lang="en-US" sz="1800" spc="-1" strike="noStrike">
+              <a:solidFill>
+                <a:srgbClr val="ffffff"/>
+              </a:solidFill>
+              <a:latin typeface="Arial"/>
+            </a:endParaRPr>
+          </a:p>
+        </p:txBody>
+      </p:sp>
+      <p:sp>
+        <p:nvSpPr>
+          <p:cNvPr id="82" name=""/>
+          <p:cNvSpPr/>
+          <p:nvPr/>
+        </p:nvSpPr>
+        <p:spPr>
+          <a:xfrm>
+            <a:off x="577440" y="4095360"/>
+            <a:ext cx="457200" cy="457200"/>
+          </a:xfrm>
+          <a:prstGeom prst="ellipse">
+            <a:avLst/>
+          </a:prstGeom>
+          <a:gradFill rotWithShape="0">
+            <a:gsLst>
+              <a:gs pos="0">
+                <a:srgbClr val="0c2130"/>
+              </a:gs>
+              <a:gs pos="100000">
+                <a:srgbClr val="254061"/>
+              </a:gs>
+            </a:gsLst>
+            <a:lin ang="3600000"/>
+          </a:gradFill>
+          <a:ln w="0">
+            <a:noFill/>
+          </a:ln>
+        </p:spPr>
+        <p:style>
+          <a:lnRef idx="0"/>
+          <a:fillRef idx="0"/>
+          <a:effectRef idx="0"/>
+          <a:fontRef idx="minor"/>
+        </p:style>
+        <p:txBody>
+          <a:bodyPr lIns="90000" rIns="90000" tIns="45000" bIns="45000" anchor="ctr">
+            <a:noAutofit/>
+          </a:bodyPr>
+          <a:p>
+            <a:endParaRPr b="0" lang="en-US" sz="1800" spc="-1" strike="noStrike">
+              <a:solidFill>
+                <a:srgbClr val="ffffff"/>
+              </a:solidFill>
+              <a:latin typeface="Arial"/>
+            </a:endParaRPr>
+          </a:p>
+        </p:txBody>
+      </p:sp>
+      <p:sp>
+        <p:nvSpPr>
+          <p:cNvPr id="83" name=""/>
+          <p:cNvSpPr/>
+          <p:nvPr/>
+        </p:nvSpPr>
+        <p:spPr>
+          <a:xfrm>
+            <a:off x="565200" y="4692960"/>
+            <a:ext cx="457200" cy="457200"/>
+          </a:xfrm>
+          <a:prstGeom prst="ellipse">
+            <a:avLst/>
+          </a:prstGeom>
+          <a:gradFill rotWithShape="0">
+            <a:gsLst>
+              <a:gs pos="0">
+                <a:srgbClr val="0c2130"/>
+              </a:gs>
+              <a:gs pos="100000">
+                <a:srgbClr val="254061"/>
+              </a:gs>
+            </a:gsLst>
+            <a:lin ang="3600000"/>
+          </a:gradFill>
+          <a:ln w="0">
+            <a:noFill/>
+          </a:ln>
+        </p:spPr>
+        <p:style>
+          <a:lnRef idx="0"/>
+          <a:fillRef idx="0"/>
+          <a:effectRef idx="0"/>
+          <a:fontRef idx="minor"/>
+        </p:style>
+        <p:txBody>
+          <a:bodyPr lIns="90000" rIns="90000" tIns="45000" bIns="45000" anchor="ctr">
+            <a:noAutofit/>
+          </a:bodyPr>
+          <a:p>
+            <a:endParaRPr b="0" lang="en-US" sz="1800" spc="-1" strike="noStrike">
+              <a:solidFill>
+                <a:srgbClr val="ffffff"/>
+              </a:solidFill>
+              <a:latin typeface="Arial"/>
+            </a:endParaRPr>
+          </a:p>
+        </p:txBody>
+      </p:sp>
+      <p:pic>
+        <p:nvPicPr>
+          <p:cNvPr id="84" name="" descr=""/>
+          <p:cNvPicPr/>
+          <p:nvPr/>
+        </p:nvPicPr>
+        <p:blipFill>
+          <a:blip r:embed="rId4"/>
+          <a:stretch/>
+        </p:blipFill>
+        <p:spPr>
+          <a:xfrm>
+            <a:off x="674280" y="4176000"/>
+            <a:ext cx="284400" cy="277200"/>
+          </a:xfrm>
+          <a:prstGeom prst="rect">
+            <a:avLst/>
+          </a:prstGeom>
+          <a:ln w="0">
+            <a:noFill/>
+          </a:ln>
+        </p:spPr>
+      </p:pic>
+      <p:pic>
+        <p:nvPicPr>
+          <p:cNvPr id="85" name="" descr=""/>
+          <p:cNvPicPr/>
+          <p:nvPr/>
+        </p:nvPicPr>
+        <p:blipFill>
+          <a:blip r:embed="rId5"/>
+          <a:stretch/>
+        </p:blipFill>
+        <p:spPr>
+          <a:xfrm>
+            <a:off x="671040" y="4788000"/>
+            <a:ext cx="284400" cy="277200"/>
+          </a:xfrm>
+          <a:prstGeom prst="rect">
+            <a:avLst/>
+          </a:prstGeom>
+          <a:ln w="0">
+            <a:noFill/>
+          </a:ln>
+        </p:spPr>
+      </p:pic>
+      <p:pic>
+        <p:nvPicPr>
+          <p:cNvPr id="86" name="" descr=""/>
+          <p:cNvPicPr/>
+          <p:nvPr/>
+        </p:nvPicPr>
+        <p:blipFill>
+          <a:blip r:embed="rId6"/>
+          <a:stretch/>
+        </p:blipFill>
+        <p:spPr>
+          <a:xfrm>
+            <a:off x="674280" y="3579840"/>
+            <a:ext cx="284400" cy="277200"/>
+          </a:xfrm>
+          <a:prstGeom prst="rect">
+            <a:avLst/>
+          </a:prstGeom>
+          <a:ln w="0">
+            <a:noFill/>
+          </a:ln>
+        </p:spPr>
+      </p:pic>
+      <p:pic>
+        <p:nvPicPr>
+          <p:cNvPr id="87" name="" descr=""/>
+          <p:cNvPicPr/>
+          <p:nvPr/>
+        </p:nvPicPr>
+        <p:blipFill>
+          <a:blip r:embed="rId7"/>
+          <a:stretch/>
+        </p:blipFill>
+        <p:spPr>
+          <a:xfrm>
+            <a:off x="674280" y="2982960"/>
+            <a:ext cx="284400" cy="277200"/>
+          </a:xfrm>
+          <a:prstGeom prst="rect">
+            <a:avLst/>
+          </a:prstGeom>
+          <a:ln w="0">
+            <a:noFill/>
+          </a:ln>
+        </p:spPr>
+      </p:pic>
+      <p:sp>
+        <p:nvSpPr>
+          <p:cNvPr id="88" name=""/>
+          <p:cNvSpPr/>
+          <p:nvPr/>
+        </p:nvSpPr>
+        <p:spPr>
+          <a:xfrm>
+            <a:off x="3769560" y="2900160"/>
+            <a:ext cx="457200" cy="457200"/>
+          </a:xfrm>
+          <a:prstGeom prst="ellipse">
+            <a:avLst/>
+          </a:prstGeom>
+          <a:gradFill rotWithShape="0">
+            <a:gsLst>
+              <a:gs pos="0">
+                <a:srgbClr val="0c2130"/>
+              </a:gs>
+              <a:gs pos="100000">
+                <a:srgbClr val="254061"/>
+              </a:gs>
+            </a:gsLst>
+            <a:lin ang="3600000"/>
+          </a:gradFill>
+          <a:ln w="0">
+            <a:noFill/>
+          </a:ln>
+        </p:spPr>
+        <p:style>
+          <a:lnRef idx="0"/>
+          <a:fillRef idx="0"/>
+          <a:effectRef idx="0"/>
+          <a:fontRef idx="minor"/>
+        </p:style>
+        <p:txBody>
+          <a:bodyPr lIns="90000" rIns="90000" tIns="45000" bIns="45000" anchor="ctr">
+            <a:noAutofit/>
+          </a:bodyPr>
+          <a:p>
+            <a:endParaRPr b="0" lang="en-US" sz="1800" spc="-1" strike="noStrike">
+              <a:solidFill>
+                <a:srgbClr val="ffffff"/>
+              </a:solidFill>
+              <a:latin typeface="Arial"/>
+            </a:endParaRPr>
+          </a:p>
+        </p:txBody>
+      </p:sp>
+      <p:sp>
+        <p:nvSpPr>
+          <p:cNvPr id="89" name=""/>
+          <p:cNvSpPr/>
+          <p:nvPr/>
+        </p:nvSpPr>
+        <p:spPr>
+          <a:xfrm>
+            <a:off x="3758400" y="3497760"/>
+            <a:ext cx="457200" cy="457200"/>
+          </a:xfrm>
+          <a:prstGeom prst="ellipse">
+            <a:avLst/>
+          </a:prstGeom>
+          <a:gradFill rotWithShape="0">
+            <a:gsLst>
+              <a:gs pos="0">
+                <a:srgbClr val="0c2130"/>
+              </a:gs>
+              <a:gs pos="100000">
+                <a:srgbClr val="254061"/>
+              </a:gs>
+            </a:gsLst>
+            <a:lin ang="3600000"/>
+          </a:gradFill>
+          <a:ln w="0">
+            <a:noFill/>
+          </a:ln>
+        </p:spPr>
+        <p:style>
+          <a:lnRef idx="0"/>
+          <a:fillRef idx="0"/>
+          <a:effectRef idx="0"/>
+          <a:fontRef idx="minor"/>
+        </p:style>
+        <p:txBody>
+          <a:bodyPr lIns="90000" rIns="90000" tIns="45000" bIns="45000" anchor="ctr">
+            <a:noAutofit/>
+          </a:bodyPr>
+          <a:p>
+            <a:endParaRPr b="0" lang="en-US" sz="1800" spc="-1" strike="noStrike">
+              <a:solidFill>
+                <a:srgbClr val="ffffff"/>
+              </a:solidFill>
+              <a:latin typeface="Arial"/>
+            </a:endParaRPr>
+          </a:p>
+        </p:txBody>
+      </p:sp>
+      <p:sp>
+        <p:nvSpPr>
+          <p:cNvPr id="90" name=""/>
+          <p:cNvSpPr/>
+          <p:nvPr/>
+        </p:nvSpPr>
+        <p:spPr>
+          <a:xfrm>
+            <a:off x="3745800" y="4095720"/>
+            <a:ext cx="457200" cy="457200"/>
+          </a:xfrm>
+          <a:prstGeom prst="ellipse">
+            <a:avLst/>
+          </a:prstGeom>
+          <a:gradFill rotWithShape="0">
+            <a:gsLst>
+              <a:gs pos="0">
+                <a:srgbClr val="0c2130"/>
+              </a:gs>
+              <a:gs pos="100000">
+                <a:srgbClr val="254061"/>
+              </a:gs>
+            </a:gsLst>
+            <a:lin ang="3600000"/>
+          </a:gradFill>
+          <a:ln w="0">
+            <a:noFill/>
+          </a:ln>
+        </p:spPr>
+        <p:style>
+          <a:lnRef idx="0"/>
+          <a:fillRef idx="0"/>
+          <a:effectRef idx="0"/>
+          <a:fontRef idx="minor"/>
+        </p:style>
+        <p:txBody>
+          <a:bodyPr lIns="90000" rIns="90000" tIns="45000" bIns="45000" anchor="ctr">
+            <a:noAutofit/>
+          </a:bodyPr>
+          <a:p>
+            <a:endParaRPr b="0" lang="en-US" sz="1800" spc="-1" strike="noStrike">
+              <a:solidFill>
+                <a:srgbClr val="ffffff"/>
+              </a:solidFill>
+              <a:latin typeface="Arial"/>
+            </a:endParaRPr>
+          </a:p>
+        </p:txBody>
+      </p:sp>
+      <p:sp>
+        <p:nvSpPr>
+          <p:cNvPr id="91" name=""/>
+          <p:cNvSpPr/>
+          <p:nvPr/>
+        </p:nvSpPr>
+        <p:spPr>
+          <a:xfrm>
+            <a:off x="3733560" y="4693320"/>
+            <a:ext cx="457200" cy="457200"/>
+          </a:xfrm>
+          <a:prstGeom prst="ellipse">
+            <a:avLst/>
+          </a:prstGeom>
+          <a:gradFill rotWithShape="0">
+            <a:gsLst>
+              <a:gs pos="0">
+                <a:srgbClr val="0c2130"/>
+              </a:gs>
+              <a:gs pos="100000">
+                <a:srgbClr val="254061"/>
+              </a:gs>
+            </a:gsLst>
+            <a:lin ang="3600000"/>
+          </a:gradFill>
+          <a:ln w="0">
+            <a:noFill/>
+          </a:ln>
+        </p:spPr>
+        <p:style>
+          <a:lnRef idx="0"/>
+          <a:fillRef idx="0"/>
+          <a:effectRef idx="0"/>
+          <a:fontRef idx="minor"/>
+        </p:style>
+        <p:txBody>
+          <a:bodyPr lIns="90000" rIns="90000" tIns="45000" bIns="45000" anchor="ctr">
+            <a:noAutofit/>
+          </a:bodyPr>
+          <a:p>
+            <a:endParaRPr b="0" lang="en-US" sz="1800" spc="-1" strike="noStrike">
+              <a:solidFill>
+                <a:srgbClr val="ffffff"/>
+              </a:solidFill>
+              <a:latin typeface="Arial"/>
+            </a:endParaRPr>
+          </a:p>
+        </p:txBody>
+      </p:sp>
+      <p:pic>
+        <p:nvPicPr>
+          <p:cNvPr id="92" name="" descr=""/>
+          <p:cNvPicPr/>
+          <p:nvPr/>
+        </p:nvPicPr>
+        <p:blipFill>
+          <a:blip r:embed="rId8"/>
+          <a:stretch/>
+        </p:blipFill>
+        <p:spPr>
+          <a:xfrm>
+            <a:off x="3842640" y="4176360"/>
+            <a:ext cx="284400" cy="277200"/>
+          </a:xfrm>
+          <a:prstGeom prst="rect">
+            <a:avLst/>
+          </a:prstGeom>
+          <a:ln w="0">
+            <a:noFill/>
+          </a:ln>
+        </p:spPr>
+      </p:pic>
+      <p:pic>
+        <p:nvPicPr>
+          <p:cNvPr id="93" name="" descr=""/>
+          <p:cNvPicPr/>
+          <p:nvPr/>
+        </p:nvPicPr>
+        <p:blipFill>
+          <a:blip r:embed="rId9"/>
+          <a:stretch/>
+        </p:blipFill>
+        <p:spPr>
+          <a:xfrm>
+            <a:off x="3839400" y="4788360"/>
+            <a:ext cx="284400" cy="277200"/>
+          </a:xfrm>
+          <a:prstGeom prst="rect">
+            <a:avLst/>
+          </a:prstGeom>
+          <a:ln w="0">
+            <a:noFill/>
+          </a:ln>
+        </p:spPr>
+      </p:pic>
+      <p:pic>
+        <p:nvPicPr>
+          <p:cNvPr id="94" name="" descr=""/>
+          <p:cNvPicPr/>
+          <p:nvPr/>
+        </p:nvPicPr>
+        <p:blipFill>
+          <a:blip r:embed="rId10"/>
+          <a:stretch/>
+        </p:blipFill>
+        <p:spPr>
+          <a:xfrm>
+            <a:off x="3842640" y="3580200"/>
+            <a:ext cx="284400" cy="277200"/>
+          </a:xfrm>
+          <a:prstGeom prst="rect">
+            <a:avLst/>
+          </a:prstGeom>
+          <a:ln w="0">
+            <a:noFill/>
+          </a:ln>
+        </p:spPr>
+      </p:pic>
+      <p:pic>
+        <p:nvPicPr>
+          <p:cNvPr id="95" name="" descr=""/>
+          <p:cNvPicPr/>
+          <p:nvPr/>
+        </p:nvPicPr>
+        <p:blipFill>
+          <a:blip r:embed="rId11"/>
+          <a:stretch/>
+        </p:blipFill>
+        <p:spPr>
+          <a:xfrm>
+            <a:off x="3842640" y="2983320"/>
+            <a:ext cx="284400" cy="277200"/>
+          </a:xfrm>
+          <a:prstGeom prst="rect">
+            <a:avLst/>
+          </a:prstGeom>
+          <a:ln w="0">
+            <a:noFill/>
+          </a:ln>
+        </p:spPr>
+      </p:pic>
+      <p:sp>
+        <p:nvSpPr>
+          <p:cNvPr id="96" name=""/>
+          <p:cNvSpPr/>
+          <p:nvPr/>
+        </p:nvSpPr>
+        <p:spPr>
+          <a:xfrm>
+            <a:off x="6937920" y="2900520"/>
+            <a:ext cx="457200" cy="457200"/>
+          </a:xfrm>
+          <a:prstGeom prst="ellipse">
+            <a:avLst/>
+          </a:prstGeom>
+          <a:gradFill rotWithShape="0">
+            <a:gsLst>
+              <a:gs pos="0">
+                <a:srgbClr val="0c2130"/>
+              </a:gs>
+              <a:gs pos="100000">
+                <a:srgbClr val="254061"/>
+              </a:gs>
+            </a:gsLst>
+            <a:lin ang="3600000"/>
+          </a:gradFill>
+          <a:ln w="0">
+            <a:noFill/>
+          </a:ln>
+        </p:spPr>
+        <p:style>
+          <a:lnRef idx="0"/>
+          <a:fillRef idx="0"/>
+          <a:effectRef idx="0"/>
+          <a:fontRef idx="minor"/>
+        </p:style>
+        <p:txBody>
+          <a:bodyPr lIns="90000" rIns="90000" tIns="45000" bIns="45000" anchor="ctr">
+            <a:noAutofit/>
+          </a:bodyPr>
+          <a:p>
+            <a:endParaRPr b="0" lang="en-US" sz="1800" spc="-1" strike="noStrike">
+              <a:solidFill>
+                <a:srgbClr val="ffffff"/>
+              </a:solidFill>
+              <a:latin typeface="Arial"/>
+            </a:endParaRPr>
+          </a:p>
+        </p:txBody>
+      </p:sp>
+      <p:sp>
+        <p:nvSpPr>
+          <p:cNvPr id="97" name=""/>
+          <p:cNvSpPr/>
+          <p:nvPr/>
+        </p:nvSpPr>
+        <p:spPr>
+          <a:xfrm>
+            <a:off x="6926760" y="3498120"/>
+            <a:ext cx="457200" cy="457200"/>
+          </a:xfrm>
+          <a:prstGeom prst="ellipse">
+            <a:avLst/>
+          </a:prstGeom>
+          <a:gradFill rotWithShape="0">
+            <a:gsLst>
+              <a:gs pos="0">
+                <a:srgbClr val="0c2130"/>
+              </a:gs>
+              <a:gs pos="100000">
+                <a:srgbClr val="254061"/>
+              </a:gs>
+            </a:gsLst>
+            <a:lin ang="3600000"/>
+          </a:gradFill>
+          <a:ln w="0">
+            <a:noFill/>
+          </a:ln>
+        </p:spPr>
+        <p:style>
+          <a:lnRef idx="0"/>
+          <a:fillRef idx="0"/>
+          <a:effectRef idx="0"/>
+          <a:fontRef idx="minor"/>
+        </p:style>
+        <p:txBody>
+          <a:bodyPr lIns="90000" rIns="90000" tIns="45000" bIns="45000" anchor="ctr">
+            <a:noAutofit/>
+          </a:bodyPr>
+          <a:p>
+            <a:endParaRPr b="0" lang="en-US" sz="1800" spc="-1" strike="noStrike">
+              <a:solidFill>
+                <a:srgbClr val="ffffff"/>
+              </a:solidFill>
+              <a:latin typeface="Arial"/>
+            </a:endParaRPr>
+          </a:p>
+        </p:txBody>
+      </p:sp>
+      <p:sp>
+        <p:nvSpPr>
+          <p:cNvPr id="98" name=""/>
+          <p:cNvSpPr/>
+          <p:nvPr/>
+        </p:nvSpPr>
+        <p:spPr>
+          <a:xfrm>
+            <a:off x="6914160" y="4096080"/>
+            <a:ext cx="457200" cy="457200"/>
+          </a:xfrm>
+          <a:prstGeom prst="ellipse">
+            <a:avLst/>
+          </a:prstGeom>
+          <a:gradFill rotWithShape="0">
+            <a:gsLst>
+              <a:gs pos="0">
+                <a:srgbClr val="0c2130"/>
+              </a:gs>
+              <a:gs pos="100000">
+                <a:srgbClr val="254061"/>
+              </a:gs>
+            </a:gsLst>
+            <a:lin ang="3600000"/>
+          </a:gradFill>
+          <a:ln w="0">
+            <a:noFill/>
+          </a:ln>
+        </p:spPr>
+        <p:style>
+          <a:lnRef idx="0"/>
+          <a:fillRef idx="0"/>
+          <a:effectRef idx="0"/>
+          <a:fontRef idx="minor"/>
+        </p:style>
+        <p:txBody>
+          <a:bodyPr lIns="90000" rIns="90000" tIns="45000" bIns="45000" anchor="ctr">
+            <a:noAutofit/>
+          </a:bodyPr>
+          <a:p>
+            <a:endParaRPr b="0" lang="en-US" sz="1800" spc="-1" strike="noStrike">
+              <a:solidFill>
+                <a:srgbClr val="ffffff"/>
+              </a:solidFill>
+              <a:latin typeface="Arial"/>
+            </a:endParaRPr>
+          </a:p>
+        </p:txBody>
+      </p:sp>
+      <p:sp>
+        <p:nvSpPr>
+          <p:cNvPr id="99" name=""/>
+          <p:cNvSpPr/>
+          <p:nvPr/>
+        </p:nvSpPr>
+        <p:spPr>
+          <a:xfrm>
+            <a:off x="6901920" y="4693680"/>
+            <a:ext cx="457200" cy="457200"/>
+          </a:xfrm>
+          <a:prstGeom prst="ellipse">
+            <a:avLst/>
+          </a:prstGeom>
+          <a:gradFill rotWithShape="0">
+            <a:gsLst>
+              <a:gs pos="0">
+                <a:srgbClr val="0c2130"/>
+              </a:gs>
+              <a:gs pos="100000">
+                <a:srgbClr val="254061"/>
+              </a:gs>
+            </a:gsLst>
+            <a:lin ang="3600000"/>
+          </a:gradFill>
+          <a:ln w="0">
+            <a:noFill/>
+          </a:ln>
+        </p:spPr>
+        <p:style>
+          <a:lnRef idx="0"/>
+          <a:fillRef idx="0"/>
+          <a:effectRef idx="0"/>
+          <a:fontRef idx="minor"/>
+        </p:style>
+        <p:txBody>
+          <a:bodyPr lIns="90000" rIns="90000" tIns="45000" bIns="45000" anchor="ctr">
+            <a:noAutofit/>
+          </a:bodyPr>
+          <a:p>
+            <a:endParaRPr b="0" lang="en-US" sz="1800" spc="-1" strike="noStrike">
+              <a:solidFill>
+                <a:srgbClr val="ffffff"/>
+              </a:solidFill>
+              <a:latin typeface="Arial"/>
+            </a:endParaRPr>
+          </a:p>
+        </p:txBody>
+      </p:sp>
+      <p:pic>
+        <p:nvPicPr>
+          <p:cNvPr id="100" name="" descr=""/>
+          <p:cNvPicPr/>
+          <p:nvPr/>
+        </p:nvPicPr>
+        <p:blipFill>
+          <a:blip r:embed="rId12"/>
+          <a:stretch/>
+        </p:blipFill>
+        <p:spPr>
+          <a:xfrm>
+            <a:off x="7011000" y="4176720"/>
+            <a:ext cx="284400" cy="277200"/>
+          </a:xfrm>
+          <a:prstGeom prst="rect">
+            <a:avLst/>
+          </a:prstGeom>
+          <a:ln w="0">
+            <a:noFill/>
+          </a:ln>
+        </p:spPr>
+      </p:pic>
+      <p:pic>
+        <p:nvPicPr>
+          <p:cNvPr id="101" name="" descr=""/>
+          <p:cNvPicPr/>
+          <p:nvPr/>
+        </p:nvPicPr>
+        <p:blipFill>
+          <a:blip r:embed="rId13"/>
+          <a:stretch/>
+        </p:blipFill>
+        <p:spPr>
+          <a:xfrm>
+            <a:off x="7007760" y="4788720"/>
+            <a:ext cx="284400" cy="277200"/>
+          </a:xfrm>
+          <a:prstGeom prst="rect">
+            <a:avLst/>
+          </a:prstGeom>
+          <a:ln w="0">
+            <a:noFill/>
+          </a:ln>
+        </p:spPr>
+      </p:pic>
+      <p:pic>
+        <p:nvPicPr>
+          <p:cNvPr id="102" name="" descr=""/>
+          <p:cNvPicPr/>
+          <p:nvPr/>
+        </p:nvPicPr>
+        <p:blipFill>
+          <a:blip r:embed="rId14"/>
+          <a:stretch/>
+        </p:blipFill>
+        <p:spPr>
+          <a:xfrm>
+            <a:off x="7011000" y="3580560"/>
+            <a:ext cx="284400" cy="277200"/>
+          </a:xfrm>
+          <a:prstGeom prst="rect">
+            <a:avLst/>
+          </a:prstGeom>
+          <a:ln w="0">
+            <a:noFill/>
+          </a:ln>
+        </p:spPr>
+      </p:pic>
+      <p:pic>
+        <p:nvPicPr>
+          <p:cNvPr id="103" name="" descr=""/>
+          <p:cNvPicPr/>
+          <p:nvPr/>
+        </p:nvPicPr>
+        <p:blipFill>
+          <a:blip r:embed="rId15"/>
+          <a:stretch/>
+        </p:blipFill>
+        <p:spPr>
+          <a:xfrm>
+            <a:off x="7011000" y="2983680"/>
+            <a:ext cx="284400" cy="277200"/>
+          </a:xfrm>
+          <a:prstGeom prst="rect">
+            <a:avLst/>
+          </a:prstGeom>
+          <a:ln w="0">
+            <a:noFill/>
+          </a:ln>
+        </p:spPr>
+      </p:pic>
     </p:spTree>
   </p:cSld>
   <mc:AlternateContent>
@@ -4614,14 +5970,180 @@
       </p:grpSpPr>
       <p:sp>
         <p:nvSpPr>
-          <p:cNvPr id="74" name=""/>
+          <p:cNvPr id="104" name=""/>
           <p:cNvSpPr/>
           <p:nvPr/>
         </p:nvSpPr>
         <p:spPr>
           <a:xfrm>
+            <a:off x="5943600" y="97200"/>
+            <a:ext cx="457200" cy="201240"/>
+          </a:xfrm>
+          <a:prstGeom prst="triangle">
+            <a:avLst>
+              <a:gd name="adj" fmla="val 53186"/>
+            </a:avLst>
+          </a:prstGeom>
+          <a:solidFill>
+            <a:srgbClr val="ffffff"/>
+          </a:solidFill>
+          <a:ln w="0">
+            <a:noFill/>
+          </a:ln>
+        </p:spPr>
+        <p:style>
+          <a:lnRef idx="0"/>
+          <a:fillRef idx="0"/>
+          <a:effectRef idx="0"/>
+          <a:fontRef idx="minor"/>
+        </p:style>
+        <p:txBody>
+          <a:bodyPr lIns="90000" rIns="90000" tIns="21960" bIns="21960" anchor="ctr">
+            <a:noAutofit/>
+          </a:bodyPr>
+          <a:p>
+            <a:endParaRPr b="0" lang="en-US" sz="1800" spc="-1" strike="noStrike">
+              <a:solidFill>
+                <a:srgbClr val="000000"/>
+              </a:solidFill>
+              <a:latin typeface="Arial"/>
+            </a:endParaRPr>
+          </a:p>
+        </p:txBody>
+      </p:sp>
+      <p:sp>
+        <p:nvSpPr>
+          <p:cNvPr id="105" name=""/>
+          <p:cNvSpPr/>
+          <p:nvPr/>
+        </p:nvSpPr>
+        <p:spPr>
+          <a:xfrm flipH="1" rot="10800000">
+            <a:off x="5029200" y="0"/>
+            <a:ext cx="1280160" cy="1280160"/>
+          </a:xfrm>
+          <a:prstGeom prst="rtTriangle">
+            <a:avLst/>
+          </a:prstGeom>
+          <a:solidFill>
+            <a:srgbClr val="0c2130"/>
+          </a:solidFill>
+          <a:ln w="0">
+            <a:noFill/>
+          </a:ln>
+        </p:spPr>
+        <p:style>
+          <a:lnRef idx="0"/>
+          <a:fillRef idx="0"/>
+          <a:effectRef idx="0"/>
+          <a:fontRef idx="minor"/>
+        </p:style>
+        <p:txBody>
+          <a:bodyPr lIns="90000" rIns="90000" tIns="45000" bIns="45000" anchor="ctr">
+            <a:noAutofit/>
+          </a:bodyPr>
+          <a:p>
+            <a:endParaRPr b="0" lang="en-US" sz="1800" spc="-1" strike="noStrike">
+              <a:solidFill>
+                <a:srgbClr val="ffffff"/>
+              </a:solidFill>
+              <a:latin typeface="Arial"/>
+            </a:endParaRPr>
+          </a:p>
+        </p:txBody>
+      </p:sp>
+      <p:sp>
+        <p:nvSpPr>
+          <p:cNvPr id="106" name=""/>
+          <p:cNvSpPr/>
+          <p:nvPr/>
+        </p:nvSpPr>
+        <p:spPr>
+          <a:xfrm>
+            <a:off x="0" y="0"/>
+            <a:ext cx="5029200" cy="1280160"/>
+          </a:xfrm>
+          <a:prstGeom prst="rect">
+            <a:avLst/>
+          </a:prstGeom>
+          <a:solidFill>
+            <a:srgbClr val="0c2130"/>
+          </a:solidFill>
+          <a:ln w="0">
+            <a:noFill/>
+          </a:ln>
+        </p:spPr>
+        <p:style>
+          <a:lnRef idx="0"/>
+          <a:fillRef idx="0"/>
+          <a:effectRef idx="0"/>
+          <a:fontRef idx="minor"/>
+        </p:style>
+        <p:txBody>
+          <a:bodyPr lIns="90000" rIns="90000" tIns="45000" bIns="45000" anchor="ctr">
+            <a:noAutofit/>
+          </a:bodyPr>
+          <a:p>
+            <a:endParaRPr b="0" lang="en-US" sz="1800" spc="-1" strike="noStrike">
+              <a:solidFill>
+                <a:srgbClr val="ffffff"/>
+              </a:solidFill>
+              <a:latin typeface="Arial"/>
+            </a:endParaRPr>
+          </a:p>
+        </p:txBody>
+      </p:sp>
+      <p:sp>
+        <p:nvSpPr>
+          <p:cNvPr id="107" name=""/>
+          <p:cNvSpPr/>
+          <p:nvPr/>
+        </p:nvSpPr>
+        <p:spPr>
+          <a:xfrm>
+            <a:off x="914400" y="276480"/>
+            <a:ext cx="4800600" cy="685800"/>
+          </a:xfrm>
+          <a:prstGeom prst="rect">
+            <a:avLst/>
+          </a:prstGeom>
+          <a:solidFill>
+            <a:srgbClr val="34659c"/>
+          </a:solidFill>
+          <a:ln w="0">
+            <a:noFill/>
+          </a:ln>
+        </p:spPr>
+        <p:style>
+          <a:lnRef idx="0"/>
+          <a:fillRef idx="0"/>
+          <a:effectRef idx="0"/>
+          <a:fontRef idx="minor"/>
+        </p:style>
+        <p:txBody>
+          <a:bodyPr lIns="90000" rIns="90000" tIns="45000" bIns="45000" anchor="ctr">
+            <a:noAutofit/>
+          </a:bodyPr>
+          <a:p>
+            <a:endParaRPr b="0" lang="en-US" sz="1800" spc="-1" strike="noStrike">
+              <a:solidFill>
+                <a:srgbClr val="000000"/>
+              </a:solidFill>
+              <a:latin typeface="Arial"/>
+            </a:endParaRPr>
+          </a:p>
+        </p:txBody>
+      </p:sp>
+      <p:sp>
+        <p:nvSpPr>
+          <p:cNvPr id="108" name=""/>
+          <p:cNvSpPr/>
+          <p:nvPr/>
+        </p:nvSpPr>
+        <p:spPr>
+          <a:xfrm>
             <a:off x="-749520" y="-831960"/>
-            <a:ext cx="2207160" cy="2203560"/>
+            <a:ext cx="2206800" cy="2203200"/>
           </a:xfrm>
           <a:prstGeom prst="ellipse">
             <a:avLst/>
@@ -4657,37 +6179,39 @@
                 <a:srgbClr val="000000"/>
               </a:solidFill>
               <a:latin typeface="Arial"/>
-            </a:endParaRPr>
-          </a:p>
-        </p:txBody>
-      </p:sp>
-      <p:sp>
-        <p:nvSpPr>
-          <p:cNvPr id="75" name=""/>
+              <a:ea typeface="DejaVu Sans"/>
+            </a:endParaRPr>
+          </a:p>
+        </p:txBody>
+      </p:sp>
+      <p:sp>
+        <p:nvSpPr>
+          <p:cNvPr id="109" name=""/>
           <p:cNvSpPr/>
           <p:nvPr/>
         </p:nvSpPr>
         <p:spPr>
           <a:xfrm>
-            <a:off x="6606000" y="48600"/>
-            <a:ext cx="2165400" cy="1828800"/>
-          </a:xfrm>
-          <a:prstGeom prst="hexagon">
-            <a:avLst>
-              <a:gd name="adj" fmla="val 29601"/>
-              <a:gd name="vf" fmla="val 115470"/>
-            </a:avLst>
+            <a:off x="9630000" y="5166000"/>
+            <a:ext cx="657000" cy="657000"/>
+          </a:xfrm>
+          <a:prstGeom prst="ellipse">
+            <a:avLst/>
           </a:prstGeom>
           <a:gradFill rotWithShape="0">
             <a:gsLst>
               <a:gs pos="0">
-                <a:srgbClr val="34659c"/>
+                <a:srgbClr val="35bd9c">
+                  <a:alpha val="95294"/>
+                </a:srgbClr>
               </a:gs>
               <a:gs pos="100000">
-                <a:srgbClr val="0c2130"/>
+                <a:srgbClr val="0c2130">
+                  <a:alpha val="95294"/>
+                </a:srgbClr>
               </a:gs>
             </a:gsLst>
-            <a:lin ang="3600000"/>
+            <a:lin ang="0"/>
           </a:gradFill>
           <a:ln w="0">
             <a:noFill/>
@@ -4704,6 +6228,16 @@
             <a:noAutofit/>
           </a:bodyPr>
           <a:p>
+            <a:pPr algn="ctr"/>
+            <a:r>
+              <a:rPr b="0" lang="en-US" sz="1800" spc="-1" strike="noStrike">
+                <a:solidFill>
+                  <a:srgbClr val="ffffff"/>
+                </a:solidFill>
+                <a:latin typeface="Lequire Rounded"/>
+              </a:rPr>
+              <a:t>4</a:t>
+            </a:r>
             <a:endParaRPr b="0" lang="en-US" sz="1800" spc="-1" strike="noStrike">
               <a:solidFill>
                 <a:srgbClr val="000000"/>
@@ -4713,30 +6247,48 @@
           </a:p>
         </p:txBody>
       </p:sp>
-      <p:sp>
-        <p:nvSpPr>
-          <p:cNvPr id="76" name=""/>
+      <p:pic>
+        <p:nvPicPr>
+          <p:cNvPr id="110" name="" descr=""/>
+          <p:cNvPicPr/>
+          <p:nvPr/>
+        </p:nvPicPr>
+        <p:blipFill>
+          <a:blip r:embed="rId1"/>
+          <a:stretch/>
+        </p:blipFill>
+        <p:spPr>
+          <a:xfrm>
+            <a:off x="182520" y="167400"/>
+            <a:ext cx="839880" cy="902880"/>
+          </a:xfrm>
+          <a:prstGeom prst="rect">
+            <a:avLst/>
+          </a:prstGeom>
+          <a:ln w="0">
+            <a:noFill/>
+          </a:ln>
+        </p:spPr>
+      </p:pic>
+      <p:sp>
+        <p:nvSpPr>
+          <p:cNvPr id="111" name=""/>
           <p:cNvSpPr/>
           <p:nvPr/>
         </p:nvSpPr>
         <p:spPr>
-          <a:xfrm rot="20400">
-            <a:off x="5410440" y="-325080"/>
-            <a:ext cx="1552680" cy="1284120"/>
-          </a:xfrm>
-          <a:prstGeom prst="hexagon">
-            <a:avLst>
-              <a:gd name="adj" fmla="val 30228"/>
-              <a:gd name="vf" fmla="val 115470"/>
-            </a:avLst>
-          </a:prstGeom>
-          <a:noFill/>
-          <a:ln cap="rnd" w="10080">
-            <a:solidFill>
-              <a:srgbClr val="35bd9c"/>
-            </a:solidFill>
-            <a:prstDash val="sysDot"/>
-            <a:round/>
+          <a:xfrm flipH="1" rot="10800000">
+            <a:off x="5714640" y="276480"/>
+            <a:ext cx="685800" cy="685800"/>
+          </a:xfrm>
+          <a:prstGeom prst="rtTriangle">
+            <a:avLst/>
+          </a:prstGeom>
+          <a:solidFill>
+            <a:srgbClr val="34659c"/>
+          </a:solidFill>
+          <a:ln w="0">
+            <a:noFill/>
           </a:ln>
         </p:spPr>
         <p:style>
@@ -4746,7 +6298,7 @@
           <a:fontRef idx="minor"/>
         </p:style>
         <p:txBody>
-          <a:bodyPr lIns="95040" rIns="95040" tIns="50040" bIns="50040" anchor="ctr">
+          <a:bodyPr lIns="90000" rIns="90000" tIns="45000" bIns="45000" anchor="ctr">
             <a:noAutofit/>
           </a:bodyPr>
           <a:p>
@@ -4761,193 +6313,19 @@
       </p:sp>
       <p:sp>
         <p:nvSpPr>
-          <p:cNvPr id="77" name=""/>
-          <p:cNvSpPr/>
-          <p:nvPr/>
-        </p:nvSpPr>
-        <p:spPr>
-          <a:xfrm rot="21537600">
-            <a:off x="8422200" y="964080"/>
-            <a:ext cx="1552680" cy="1284120"/>
-          </a:xfrm>
-          <a:prstGeom prst="hexagon">
-            <a:avLst>
-              <a:gd name="adj" fmla="val 30228"/>
-              <a:gd name="vf" fmla="val 115470"/>
-            </a:avLst>
+          <p:cNvPr id="112" name=""/>
+          <p:cNvSpPr txBox="1"/>
+          <p:nvPr/>
+        </p:nvSpPr>
+        <p:spPr>
+          <a:xfrm>
+            <a:off x="1472760" y="421200"/>
+            <a:ext cx="4242240" cy="434880"/>
+          </a:xfrm>
+          <a:prstGeom prst="rect">
+            <a:avLst/>
           </a:prstGeom>
           <a:noFill/>
-          <a:ln w="12600">
-            <a:solidFill>
-              <a:srgbClr val="0c2130"/>
-            </a:solidFill>
-            <a:round/>
-          </a:ln>
-        </p:spPr>
-        <p:style>
-          <a:lnRef idx="0"/>
-          <a:fillRef idx="0"/>
-          <a:effectRef idx="0"/>
-          <a:fontRef idx="minor"/>
-        </p:style>
-        <p:txBody>
-          <a:bodyPr lIns="96120" rIns="96120" tIns="51120" bIns="51120" anchor="ctr">
-            <a:noAutofit/>
-          </a:bodyPr>
-          <a:p>
-            <a:endParaRPr b="0" lang="en-US" sz="1800" spc="-1" strike="noStrike">
-              <a:solidFill>
-                <a:srgbClr val="000000"/>
-              </a:solidFill>
-              <a:latin typeface="Arial"/>
-            </a:endParaRPr>
-          </a:p>
-        </p:txBody>
-      </p:sp>
-      <p:sp>
-        <p:nvSpPr>
-          <p:cNvPr id="78" name=""/>
-          <p:cNvSpPr/>
-          <p:nvPr/>
-        </p:nvSpPr>
-        <p:spPr>
-          <a:xfrm rot="28200">
-            <a:off x="6477840" y="1595880"/>
-            <a:ext cx="651960" cy="534240"/>
-          </a:xfrm>
-          <a:prstGeom prst="hexagon">
-            <a:avLst>
-              <a:gd name="adj" fmla="val 30509"/>
-              <a:gd name="vf" fmla="val 115470"/>
-            </a:avLst>
-          </a:prstGeom>
-          <a:solidFill>
-            <a:srgbClr val="35bd9c"/>
-          </a:solidFill>
-          <a:ln w="0">
-            <a:noFill/>
-          </a:ln>
-        </p:spPr>
-        <p:style>
-          <a:lnRef idx="0"/>
-          <a:fillRef idx="0"/>
-          <a:effectRef idx="0"/>
-          <a:fontRef idx="minor"/>
-        </p:style>
-        <p:txBody>
-          <a:bodyPr lIns="90000" rIns="90000" tIns="45000" bIns="45000" anchor="ctr">
-            <a:noAutofit/>
-          </a:bodyPr>
-          <a:p>
-            <a:endParaRPr b="0" lang="en-US" sz="1800" spc="-1" strike="noStrike">
-              <a:solidFill>
-                <a:srgbClr val="000000"/>
-              </a:solidFill>
-              <a:latin typeface="Arial"/>
-            </a:endParaRPr>
-          </a:p>
-        </p:txBody>
-      </p:sp>
-      <p:sp>
-        <p:nvSpPr>
-          <p:cNvPr id="79" name=""/>
-          <p:cNvSpPr/>
-          <p:nvPr/>
-        </p:nvSpPr>
-        <p:spPr>
-          <a:xfrm rot="42000">
-            <a:off x="8609040" y="385920"/>
-            <a:ext cx="651960" cy="534240"/>
-          </a:xfrm>
-          <a:prstGeom prst="hexagon">
-            <a:avLst>
-              <a:gd name="adj" fmla="val 30509"/>
-              <a:gd name="vf" fmla="val 115470"/>
-            </a:avLst>
-          </a:prstGeom>
-          <a:solidFill>
-            <a:srgbClr val="35bd9c"/>
-          </a:solidFill>
-          <a:ln w="0">
-            <a:noFill/>
-          </a:ln>
-        </p:spPr>
-        <p:style>
-          <a:lnRef idx="0"/>
-          <a:fillRef idx="0"/>
-          <a:effectRef idx="0"/>
-          <a:fontRef idx="minor"/>
-        </p:style>
-        <p:txBody>
-          <a:bodyPr lIns="90000" rIns="90000" tIns="45000" bIns="45000" anchor="ctr">
-            <a:noAutofit/>
-          </a:bodyPr>
-          <a:p>
-            <a:endParaRPr b="0" lang="en-US" sz="1800" spc="-1" strike="noStrike">
-              <a:solidFill>
-                <a:srgbClr val="000000"/>
-              </a:solidFill>
-              <a:latin typeface="Arial"/>
-            </a:endParaRPr>
-          </a:p>
-        </p:txBody>
-      </p:sp>
-      <p:sp>
-        <p:nvSpPr>
-          <p:cNvPr id="80" name=""/>
-          <p:cNvSpPr/>
-          <p:nvPr/>
-        </p:nvSpPr>
-        <p:spPr>
-          <a:xfrm>
-            <a:off x="0" y="5257800"/>
-            <a:ext cx="10080000" cy="412200"/>
-          </a:xfrm>
-          <a:prstGeom prst="rect">
-            <a:avLst/>
-          </a:prstGeom>
-          <a:solidFill>
-            <a:srgbClr val="729fcf"/>
-          </a:solidFill>
-          <a:ln w="0">
-            <a:noFill/>
-          </a:ln>
-        </p:spPr>
-        <p:style>
-          <a:lnRef idx="0"/>
-          <a:fillRef idx="0"/>
-          <a:effectRef idx="0"/>
-          <a:fontRef idx="minor"/>
-        </p:style>
-        <p:txBody>
-          <a:bodyPr lIns="90000" rIns="90000" tIns="45000" bIns="45000" anchor="ctr">
-            <a:noAutofit/>
-          </a:bodyPr>
-          <a:p>
-            <a:endParaRPr b="0" lang="en-US" sz="1800" spc="-1" strike="noStrike">
-              <a:solidFill>
-                <a:srgbClr val="000000"/>
-              </a:solidFill>
-              <a:latin typeface="Arial"/>
-            </a:endParaRPr>
-          </a:p>
-        </p:txBody>
-      </p:sp>
-      <p:sp>
-        <p:nvSpPr>
-          <p:cNvPr id="81" name=""/>
-          <p:cNvSpPr txBox="1"/>
-          <p:nvPr/>
-        </p:nvSpPr>
-        <p:spPr>
-          <a:xfrm>
-            <a:off x="3785040" y="950400"/>
-            <a:ext cx="2437920" cy="346320"/>
-          </a:xfrm>
-          <a:prstGeom prst="rect">
-            <a:avLst/>
-          </a:prstGeom>
-          <a:noFill/>
           <a:ln w="0">
             <a:noFill/>
           </a:ln>
@@ -4958,152 +6336,69 @@
           </a:bodyPr>
           <a:p>
             <a:r>
-              <a:rPr b="0" lang="en-US" sz="1800" spc="-1" strike="noStrike">
+              <a:rPr b="1" lang="en-US" sz="2600" spc="-1" strike="noStrike">
                 <a:solidFill>
-                  <a:srgbClr val="000000"/>
+                  <a:srgbClr val="35bd9c"/>
                 </a:solidFill>
-                <a:latin typeface="Arial"/>
+                <a:latin typeface="Helios Rounded"/>
               </a:rPr>
-              <a:t>TABLE OF CONTENT</a:t>
+              <a:t>What is the problem ?</a:t>
             </a:r>
-            <a:endParaRPr b="0" lang="en-US" sz="1800" spc="-1" strike="noStrike">
-              <a:solidFill>
-                <a:srgbClr val="000000"/>
-              </a:solidFill>
-              <a:latin typeface="Arial"/>
-            </a:endParaRPr>
-          </a:p>
-        </p:txBody>
-      </p:sp>
-      <p:sp>
-        <p:nvSpPr>
-          <p:cNvPr id="82" name=""/>
-          <p:cNvSpPr/>
-          <p:nvPr/>
-        </p:nvSpPr>
-        <p:spPr>
-          <a:xfrm>
-            <a:off x="399960" y="2743200"/>
-            <a:ext cx="2800440" cy="2514600"/>
-          </a:xfrm>
-          <a:prstGeom prst="rect">
-            <a:avLst/>
-          </a:prstGeom>
-          <a:solidFill>
-            <a:srgbClr val="729fcf"/>
-          </a:solidFill>
-          <a:ln w="0">
-            <a:solidFill>
-              <a:srgbClr val="3465a4"/>
-            </a:solidFill>
-          </a:ln>
-        </p:spPr>
-        <p:style>
-          <a:lnRef idx="0"/>
-          <a:fillRef idx="0"/>
-          <a:effectRef idx="0"/>
-          <a:fontRef idx="minor"/>
-        </p:style>
-        <p:txBody>
-          <a:bodyPr lIns="90000" rIns="90000" tIns="45000" bIns="45000" anchor="ctr">
-            <a:noAutofit/>
-          </a:bodyPr>
-          <a:p>
-            <a:endParaRPr b="0" lang="en-US" sz="1800" spc="-1" strike="noStrike">
-              <a:solidFill>
-                <a:srgbClr val="000000"/>
-              </a:solidFill>
-              <a:latin typeface="Arial"/>
-            </a:endParaRPr>
-          </a:p>
-        </p:txBody>
-      </p:sp>
-      <p:sp>
-        <p:nvSpPr>
-          <p:cNvPr id="83" name=""/>
-          <p:cNvSpPr/>
-          <p:nvPr/>
-        </p:nvSpPr>
-        <p:spPr>
-          <a:xfrm>
-            <a:off x="3514680" y="2743200"/>
-            <a:ext cx="2800440" cy="2514600"/>
-          </a:xfrm>
-          <a:prstGeom prst="rect">
-            <a:avLst/>
-          </a:prstGeom>
-          <a:solidFill>
-            <a:srgbClr val="729fcf"/>
-          </a:solidFill>
-          <a:ln w="0">
-            <a:solidFill>
-              <a:srgbClr val="3465a4"/>
-            </a:solidFill>
-          </a:ln>
-        </p:spPr>
-        <p:style>
-          <a:lnRef idx="0"/>
-          <a:fillRef idx="0"/>
-          <a:effectRef idx="0"/>
-          <a:fontRef idx="minor"/>
-        </p:style>
-        <p:txBody>
-          <a:bodyPr lIns="90000" rIns="90000" tIns="45000" bIns="45000" anchor="ctr">
-            <a:noAutofit/>
-          </a:bodyPr>
-          <a:p>
-            <a:endParaRPr b="0" lang="en-US" sz="1800" spc="-1" strike="noStrike">
-              <a:solidFill>
-                <a:srgbClr val="000000"/>
-              </a:solidFill>
-              <a:latin typeface="Arial"/>
-            </a:endParaRPr>
-          </a:p>
-        </p:txBody>
-      </p:sp>
-      <p:sp>
-        <p:nvSpPr>
-          <p:cNvPr id="84" name=""/>
-          <p:cNvSpPr/>
-          <p:nvPr/>
-        </p:nvSpPr>
-        <p:spPr>
-          <a:xfrm>
-            <a:off x="6629400" y="2743200"/>
-            <a:ext cx="2800440" cy="2514600"/>
-          </a:xfrm>
-          <a:prstGeom prst="rect">
-            <a:avLst/>
-          </a:prstGeom>
-          <a:solidFill>
-            <a:srgbClr val="729fcf"/>
-          </a:solidFill>
-          <a:ln w="0">
-            <a:solidFill>
-              <a:srgbClr val="3465a4"/>
-            </a:solidFill>
-          </a:ln>
-        </p:spPr>
-        <p:style>
-          <a:lnRef idx="0"/>
-          <a:fillRef idx="0"/>
-          <a:effectRef idx="0"/>
-          <a:fontRef idx="minor"/>
-        </p:style>
-        <p:txBody>
-          <a:bodyPr lIns="90000" rIns="90000" tIns="45000" bIns="45000" anchor="ctr">
-            <a:noAutofit/>
-          </a:bodyPr>
-          <a:p>
-            <a:endParaRPr b="0" lang="en-US" sz="1800" spc="-1" strike="noStrike">
-              <a:solidFill>
-                <a:srgbClr val="000000"/>
-              </a:solidFill>
-              <a:latin typeface="Arial"/>
-            </a:endParaRPr>
-          </a:p>
-        </p:txBody>
-      </p:sp>
+            <a:endParaRPr b="0" lang="en-US" sz="2600" spc="-1" strike="noStrike">
+              <a:solidFill>
+                <a:srgbClr val="35bd9c"/>
+              </a:solidFill>
+              <a:latin typeface="Arial"/>
+            </a:endParaRPr>
+          </a:p>
+        </p:txBody>
+      </p:sp>
+      <p:pic>
+        <p:nvPicPr>
+          <p:cNvPr id="113" name="" descr=""/>
+          <p:cNvPicPr/>
+          <p:nvPr/>
+        </p:nvPicPr>
+        <p:blipFill>
+          <a:blip r:embed="rId2"/>
+          <a:stretch/>
+        </p:blipFill>
+        <p:spPr>
+          <a:xfrm rot="477000">
+            <a:off x="8119800" y="84600"/>
+            <a:ext cx="1600200" cy="1600200"/>
+          </a:xfrm>
+          <a:prstGeom prst="rect">
+            <a:avLst/>
+          </a:prstGeom>
+          <a:ln w="0">
+            <a:noFill/>
+          </a:ln>
+        </p:spPr>
+      </p:pic>
+      <p:pic>
+        <p:nvPicPr>
+          <p:cNvPr id="114" name="" descr=""/>
+          <p:cNvPicPr/>
+          <p:nvPr/>
+        </p:nvPicPr>
+        <p:blipFill>
+          <a:blip r:embed="rId3"/>
+          <a:stretch/>
+        </p:blipFill>
+        <p:spPr>
+          <a:xfrm>
+            <a:off x="5088600" y="1371600"/>
+            <a:ext cx="4572000" cy="4572000"/>
+          </a:xfrm>
+          <a:prstGeom prst="rect">
+            <a:avLst/>
+          </a:prstGeom>
+          <a:ln w="0">
+            <a:noFill/>
+          </a:ln>
+        </p:spPr>
+      </p:pic>
     </p:spTree>
   </p:cSld>
   <mc:AlternateContent>
@@ -5122,10 +6417,10 @@
   <a:themeElements>
     <a:clrScheme name="Office">
       <a:dk1>
-        <a:sysClr val="windowText" lastClr="000000"/>
+        <a:srgbClr val="000000"/>
       </a:dk1>
       <a:lt1>
-        <a:sysClr val="window" lastClr="FFFFFF"/>
+        <a:srgbClr val="ffffff"/>
       </a:lt1>
       <a:dk2>
         <a:srgbClr val="1f497d"/>

</xml_diff>